<commit_message>
took some more data
</commit_message>
<xml_diff>
--- a/plotting_and_data/zzx_L26.pptx
+++ b/plotting_and_data/zzx_L26.pptx
@@ -104,6 +104,11 @@
       </a:defRPr>
     </a:lvl9pPr>
   </p:defaultTextStyle>
+  <p:extLst>
+    <p:ext uri="{EFAFB233-063F-42B5-8137-9DF3F51BA10A}">
+      <p15:sldGuideLst xmlns:p15="http://schemas.microsoft.com/office/powerpoint/2012/main"/>
+    </p:ext>
+  </p:extLst>
 </p:presentation>
 </file>
 
@@ -3458,8 +3463,8 @@
           </a:p>
         </p:txBody>
       </p:sp>
-      <mc:AlternateContent xmlns:mc="http://schemas.openxmlformats.org/markup-compatibility/2006">
-        <mc:Choice xmlns:a14="http://schemas.microsoft.com/office/drawing/2010/main" Requires="a14">
+      <mc:AlternateContent xmlns:mc="http://schemas.openxmlformats.org/markup-compatibility/2006" xmlns:a14="http://schemas.microsoft.com/office/drawing/2010/main">
+        <mc:Choice Requires="a14">
           <p:sp>
             <p:nvSpPr>
               <p:cNvPr id="11" name="TextBox 10">
@@ -3543,7 +3548,7 @@
             </p:txBody>
           </p:sp>
         </mc:Choice>
-        <mc:Fallback>
+        <mc:Fallback xmlns="">
           <p:sp>
             <p:nvSpPr>
               <p:cNvPr id="11" name="TextBox 10">

</xml_diff>

<commit_message>
BD and tr data
</commit_message>
<xml_diff>
--- a/plotting_and_data/zzx_L26.pptx
+++ b/plotting_and_data/zzx_L26.pptx
@@ -7,6 +7,9 @@
   <p:sldIdLst>
     <p:sldId id="256" r:id="rId2"/>
     <p:sldId id="257" r:id="rId3"/>
+    <p:sldId id="258" r:id="rId4"/>
+    <p:sldId id="259" r:id="rId5"/>
+    <p:sldId id="260" r:id="rId6"/>
   </p:sldIdLst>
   <p:sldSz cx="12192000" cy="6858000"/>
   <p:notesSz cx="6858000" cy="9144000"/>
@@ -260,7 +263,7 @@
           <a:p>
             <a:fld id="{2B3C3A7C-569B-4175-B09F-B289B3E9820E}" type="datetimeFigureOut">
               <a:rPr lang="en-US" smtClean="0"/>
-              <a:t>10/18/2019</a:t>
+              <a:t>10/22/2019</a:t>
             </a:fld>
             <a:endParaRPr lang="en-US"/>
           </a:p>
@@ -458,7 +461,7 @@
           <a:p>
             <a:fld id="{2B3C3A7C-569B-4175-B09F-B289B3E9820E}" type="datetimeFigureOut">
               <a:rPr lang="en-US" smtClean="0"/>
-              <a:t>10/18/2019</a:t>
+              <a:t>10/22/2019</a:t>
             </a:fld>
             <a:endParaRPr lang="en-US"/>
           </a:p>
@@ -666,7 +669,7 @@
           <a:p>
             <a:fld id="{2B3C3A7C-569B-4175-B09F-B289B3E9820E}" type="datetimeFigureOut">
               <a:rPr lang="en-US" smtClean="0"/>
-              <a:t>10/18/2019</a:t>
+              <a:t>10/22/2019</a:t>
             </a:fld>
             <a:endParaRPr lang="en-US"/>
           </a:p>
@@ -864,7 +867,7 @@
           <a:p>
             <a:fld id="{2B3C3A7C-569B-4175-B09F-B289B3E9820E}" type="datetimeFigureOut">
               <a:rPr lang="en-US" smtClean="0"/>
-              <a:t>10/18/2019</a:t>
+              <a:t>10/22/2019</a:t>
             </a:fld>
             <a:endParaRPr lang="en-US"/>
           </a:p>
@@ -1139,7 +1142,7 @@
           <a:p>
             <a:fld id="{2B3C3A7C-569B-4175-B09F-B289B3E9820E}" type="datetimeFigureOut">
               <a:rPr lang="en-US" smtClean="0"/>
-              <a:t>10/18/2019</a:t>
+              <a:t>10/22/2019</a:t>
             </a:fld>
             <a:endParaRPr lang="en-US"/>
           </a:p>
@@ -1404,7 +1407,7 @@
           <a:p>
             <a:fld id="{2B3C3A7C-569B-4175-B09F-B289B3E9820E}" type="datetimeFigureOut">
               <a:rPr lang="en-US" smtClean="0"/>
-              <a:t>10/18/2019</a:t>
+              <a:t>10/22/2019</a:t>
             </a:fld>
             <a:endParaRPr lang="en-US"/>
           </a:p>
@@ -1816,7 +1819,7 @@
           <a:p>
             <a:fld id="{2B3C3A7C-569B-4175-B09F-B289B3E9820E}" type="datetimeFigureOut">
               <a:rPr lang="en-US" smtClean="0"/>
-              <a:t>10/18/2019</a:t>
+              <a:t>10/22/2019</a:t>
             </a:fld>
             <a:endParaRPr lang="en-US"/>
           </a:p>
@@ -1957,7 +1960,7 @@
           <a:p>
             <a:fld id="{2B3C3A7C-569B-4175-B09F-B289B3E9820E}" type="datetimeFigureOut">
               <a:rPr lang="en-US" smtClean="0"/>
-              <a:t>10/18/2019</a:t>
+              <a:t>10/22/2019</a:t>
             </a:fld>
             <a:endParaRPr lang="en-US"/>
           </a:p>
@@ -2070,7 +2073,7 @@
           <a:p>
             <a:fld id="{2B3C3A7C-569B-4175-B09F-B289B3E9820E}" type="datetimeFigureOut">
               <a:rPr lang="en-US" smtClean="0"/>
-              <a:t>10/18/2019</a:t>
+              <a:t>10/22/2019</a:t>
             </a:fld>
             <a:endParaRPr lang="en-US"/>
           </a:p>
@@ -2381,7 +2384,7 @@
           <a:p>
             <a:fld id="{2B3C3A7C-569B-4175-B09F-B289B3E9820E}" type="datetimeFigureOut">
               <a:rPr lang="en-US" smtClean="0"/>
-              <a:t>10/18/2019</a:t>
+              <a:t>10/22/2019</a:t>
             </a:fld>
             <a:endParaRPr lang="en-US"/>
           </a:p>
@@ -2669,7 +2672,7 @@
           <a:p>
             <a:fld id="{2B3C3A7C-569B-4175-B09F-B289B3E9820E}" type="datetimeFigureOut">
               <a:rPr lang="en-US" smtClean="0"/>
-              <a:t>10/18/2019</a:t>
+              <a:t>10/22/2019</a:t>
             </a:fld>
             <a:endParaRPr lang="en-US"/>
           </a:p>
@@ -2910,7 +2913,7 @@
           <a:p>
             <a:fld id="{2B3C3A7C-569B-4175-B09F-B289B3E9820E}" type="datetimeFigureOut">
               <a:rPr lang="en-US" smtClean="0"/>
-              <a:t>10/18/2019</a:t>
+              <a:t>10/22/2019</a:t>
             </a:fld>
             <a:endParaRPr lang="en-US"/>
           </a:p>
@@ -4430,6 +4433,1945 @@
 </p:sld>
 </file>
 
+<file path=ppt/slides/slide3.xml><?xml version="1.0" encoding="utf-8"?>
+<p:sld xmlns:a="http://schemas.openxmlformats.org/drawingml/2006/main" xmlns:r="http://schemas.openxmlformats.org/officeDocument/2006/relationships" xmlns:p="http://schemas.openxmlformats.org/presentationml/2006/main">
+  <p:cSld>
+    <p:spTree>
+      <p:nvGrpSpPr>
+        <p:cNvPr id="1" name=""/>
+        <p:cNvGrpSpPr/>
+        <p:nvPr/>
+      </p:nvGrpSpPr>
+      <p:grpSpPr>
+        <a:xfrm>
+          <a:off x="0" y="0"/>
+          <a:ext cx="0" cy="0"/>
+          <a:chOff x="0" y="0"/>
+          <a:chExt cx="0" cy="0"/>
+        </a:xfrm>
+      </p:grpSpPr>
+      <p:pic>
+        <p:nvPicPr>
+          <p:cNvPr id="17" name="Graphic 16">
+            <a:extLst>
+              <a:ext uri="{FF2B5EF4-FFF2-40B4-BE49-F238E27FC236}">
+                <a16:creationId xmlns:a16="http://schemas.microsoft.com/office/drawing/2014/main" id="{60C9C6ED-4E35-48E1-98B3-BD84EF7CBBDA}"/>
+              </a:ext>
+            </a:extLst>
+          </p:cNvPr>
+          <p:cNvPicPr>
+            <a:picLocks noChangeAspect="1"/>
+          </p:cNvPicPr>
+          <p:nvPr/>
+        </p:nvPicPr>
+        <p:blipFill>
+          <a:blip r:embed="rId2">
+            <a:extLst>
+              <a:ext uri="{28A0092B-C50C-407E-A947-70E740481C1C}">
+                <a14:useLocalDpi xmlns:a14="http://schemas.microsoft.com/office/drawing/2010/main" val="0"/>
+              </a:ext>
+              <a:ext uri="{96DAC541-7B7A-43D3-8B79-37D633B846F1}">
+                <asvg:svgBlip xmlns:asvg="http://schemas.microsoft.com/office/drawing/2016/SVG/main" r:embed="rId3"/>
+              </a:ext>
+            </a:extLst>
+          </a:blip>
+          <a:stretch>
+            <a:fillRect/>
+          </a:stretch>
+        </p:blipFill>
+        <p:spPr>
+          <a:xfrm>
+            <a:off x="5747728" y="3621426"/>
+            <a:ext cx="5254763" cy="2977062"/>
+          </a:xfrm>
+          <a:prstGeom prst="rect">
+            <a:avLst/>
+          </a:prstGeom>
+        </p:spPr>
+      </p:pic>
+      <p:pic>
+        <p:nvPicPr>
+          <p:cNvPr id="7" name="Graphic 6">
+            <a:extLst>
+              <a:ext uri="{FF2B5EF4-FFF2-40B4-BE49-F238E27FC236}">
+                <a16:creationId xmlns:a16="http://schemas.microsoft.com/office/drawing/2014/main" id="{4FE99958-7EB7-423F-9365-AA4C2C58AC9C}"/>
+              </a:ext>
+            </a:extLst>
+          </p:cNvPr>
+          <p:cNvPicPr>
+            <a:picLocks noChangeAspect="1"/>
+          </p:cNvPicPr>
+          <p:nvPr/>
+        </p:nvPicPr>
+        <p:blipFill>
+          <a:blip r:embed="rId4">
+            <a:extLst>
+              <a:ext uri="{28A0092B-C50C-407E-A947-70E740481C1C}">
+                <a14:useLocalDpi xmlns:a14="http://schemas.microsoft.com/office/drawing/2010/main" val="0"/>
+              </a:ext>
+              <a:ext uri="{96DAC541-7B7A-43D3-8B79-37D633B846F1}">
+                <asvg:svgBlip xmlns:asvg="http://schemas.microsoft.com/office/drawing/2016/SVG/main" r:embed="rId5"/>
+              </a:ext>
+            </a:extLst>
+          </a:blip>
+          <a:stretch>
+            <a:fillRect/>
+          </a:stretch>
+        </p:blipFill>
+        <p:spPr>
+          <a:xfrm>
+            <a:off x="2" y="0"/>
+            <a:ext cx="5014912" cy="3763229"/>
+          </a:xfrm>
+          <a:prstGeom prst="rect">
+            <a:avLst/>
+          </a:prstGeom>
+        </p:spPr>
+      </p:pic>
+      <p:pic>
+        <p:nvPicPr>
+          <p:cNvPr id="9" name="Graphic 8">
+            <a:extLst>
+              <a:ext uri="{FF2B5EF4-FFF2-40B4-BE49-F238E27FC236}">
+                <a16:creationId xmlns:a16="http://schemas.microsoft.com/office/drawing/2014/main" id="{7E026C18-F3DB-49C8-B619-6DA320EF3BEC}"/>
+              </a:ext>
+            </a:extLst>
+          </p:cNvPr>
+          <p:cNvPicPr>
+            <a:picLocks noChangeAspect="1"/>
+          </p:cNvPicPr>
+          <p:nvPr/>
+        </p:nvPicPr>
+        <p:blipFill>
+          <a:blip r:embed="rId6">
+            <a:extLst>
+              <a:ext uri="{28A0092B-C50C-407E-A947-70E740481C1C}">
+                <a14:useLocalDpi xmlns:a14="http://schemas.microsoft.com/office/drawing/2010/main" val="0"/>
+              </a:ext>
+              <a:ext uri="{96DAC541-7B7A-43D3-8B79-37D633B846F1}">
+                <asvg:svgBlip xmlns:asvg="http://schemas.microsoft.com/office/drawing/2016/SVG/main" r:embed="rId7"/>
+              </a:ext>
+            </a:extLst>
+          </a:blip>
+          <a:stretch>
+            <a:fillRect/>
+          </a:stretch>
+        </p:blipFill>
+        <p:spPr>
+          <a:xfrm>
+            <a:off x="6081558" y="0"/>
+            <a:ext cx="4920933" cy="3692707"/>
+          </a:xfrm>
+          <a:prstGeom prst="rect">
+            <a:avLst/>
+          </a:prstGeom>
+        </p:spPr>
+      </p:pic>
+      <p:sp>
+        <p:nvSpPr>
+          <p:cNvPr id="10" name="TextBox 9">
+            <a:extLst>
+              <a:ext uri="{FF2B5EF4-FFF2-40B4-BE49-F238E27FC236}">
+                <a16:creationId xmlns:a16="http://schemas.microsoft.com/office/drawing/2014/main" id="{0F2DC09E-91F4-43DE-A8C3-84BBE7C17FF9}"/>
+              </a:ext>
+            </a:extLst>
+          </p:cNvPr>
+          <p:cNvSpPr txBox="1"/>
+          <p:nvPr/>
+        </p:nvSpPr>
+        <p:spPr>
+          <a:xfrm rot="16200000">
+            <a:off x="4987136" y="1379061"/>
+            <a:ext cx="1890517" cy="369332"/>
+          </a:xfrm>
+          <a:prstGeom prst="rect">
+            <a:avLst/>
+          </a:prstGeom>
+          <a:noFill/>
+        </p:spPr>
+        <p:txBody>
+          <a:bodyPr wrap="square" rtlCol="0">
+            <a:spAutoFit/>
+          </a:bodyPr>
+          <a:lstStyle/>
+          <a:p>
+            <a:r>
+              <a:rPr lang="en-US" dirty="0"/>
+              <a:t>Phase Error</a:t>
+            </a:r>
+          </a:p>
+        </p:txBody>
+      </p:sp>
+      <p:sp>
+        <p:nvSpPr>
+          <p:cNvPr id="11" name="TextBox 10">
+            <a:extLst>
+              <a:ext uri="{FF2B5EF4-FFF2-40B4-BE49-F238E27FC236}">
+                <a16:creationId xmlns:a16="http://schemas.microsoft.com/office/drawing/2014/main" id="{67059BC2-2F41-4420-9577-BDCC2BE40CEA}"/>
+              </a:ext>
+            </a:extLst>
+          </p:cNvPr>
+          <p:cNvSpPr txBox="1"/>
+          <p:nvPr/>
+        </p:nvSpPr>
+        <p:spPr>
+          <a:xfrm>
+            <a:off x="7560518" y="3429000"/>
+            <a:ext cx="2540743" cy="369332"/>
+          </a:xfrm>
+          <a:prstGeom prst="rect">
+            <a:avLst/>
+          </a:prstGeom>
+          <a:noFill/>
+        </p:spPr>
+        <p:txBody>
+          <a:bodyPr wrap="square" rtlCol="0">
+            <a:spAutoFit/>
+          </a:bodyPr>
+          <a:lstStyle/>
+          <a:p>
+            <a:r>
+              <a:rPr lang="en-US" dirty="0"/>
+              <a:t>Vmax</a:t>
+            </a:r>
+          </a:p>
+        </p:txBody>
+      </p:sp>
+      <p:grpSp>
+        <p:nvGrpSpPr>
+          <p:cNvPr id="18" name="Group 17">
+            <a:extLst>
+              <a:ext uri="{FF2B5EF4-FFF2-40B4-BE49-F238E27FC236}">
+                <a16:creationId xmlns:a16="http://schemas.microsoft.com/office/drawing/2014/main" id="{8EDA749D-A894-49D2-BF1B-03CD1F144585}"/>
+              </a:ext>
+            </a:extLst>
+          </p:cNvPr>
+          <p:cNvGrpSpPr/>
+          <p:nvPr/>
+        </p:nvGrpSpPr>
+        <p:grpSpPr>
+          <a:xfrm>
+            <a:off x="2090739" y="3539393"/>
+            <a:ext cx="2648798" cy="408502"/>
+            <a:chOff x="2090739" y="3539393"/>
+            <a:chExt cx="2648798" cy="408502"/>
+          </a:xfrm>
+        </p:grpSpPr>
+        <p:sp>
+          <p:nvSpPr>
+            <p:cNvPr id="12" name="Rectangle 11">
+              <a:extLst>
+                <a:ext uri="{FF2B5EF4-FFF2-40B4-BE49-F238E27FC236}">
+                  <a16:creationId xmlns:a16="http://schemas.microsoft.com/office/drawing/2014/main" id="{88C8B32F-4D30-4FF3-88EF-3DA25EFA118C}"/>
+                </a:ext>
+              </a:extLst>
+            </p:cNvPr>
+            <p:cNvSpPr/>
+            <p:nvPr/>
+          </p:nvSpPr>
+          <p:spPr>
+            <a:xfrm>
+              <a:off x="2090739" y="3539393"/>
+              <a:ext cx="1595282" cy="335446"/>
+            </a:xfrm>
+            <a:prstGeom prst="rect">
+              <a:avLst/>
+            </a:prstGeom>
+            <a:solidFill>
+              <a:schemeClr val="bg1"/>
+            </a:solidFill>
+            <a:ln>
+              <a:solidFill>
+                <a:schemeClr val="bg1"/>
+              </a:solidFill>
+            </a:ln>
+          </p:spPr>
+          <p:style>
+            <a:lnRef idx="2">
+              <a:schemeClr val="accent1">
+                <a:shade val="50000"/>
+              </a:schemeClr>
+            </a:lnRef>
+            <a:fillRef idx="1">
+              <a:schemeClr val="accent1"/>
+            </a:fillRef>
+            <a:effectRef idx="0">
+              <a:schemeClr val="accent1"/>
+            </a:effectRef>
+            <a:fontRef idx="minor">
+              <a:schemeClr val="lt1"/>
+            </a:fontRef>
+          </p:style>
+          <p:txBody>
+            <a:bodyPr rtlCol="0" anchor="ctr"/>
+            <a:lstStyle/>
+            <a:p>
+              <a:pPr algn="ctr"/>
+              <a:endParaRPr lang="en-US"/>
+            </a:p>
+          </p:txBody>
+        </p:sp>
+        <p:sp>
+          <p:nvSpPr>
+            <p:cNvPr id="13" name="TextBox 12">
+              <a:extLst>
+                <a:ext uri="{FF2B5EF4-FFF2-40B4-BE49-F238E27FC236}">
+                  <a16:creationId xmlns:a16="http://schemas.microsoft.com/office/drawing/2014/main" id="{FCC3C104-97D1-4BF1-9F13-D2434832C651}"/>
+                </a:ext>
+              </a:extLst>
+            </p:cNvPr>
+            <p:cNvSpPr txBox="1"/>
+            <p:nvPr/>
+          </p:nvSpPr>
+          <p:spPr>
+            <a:xfrm>
+              <a:off x="2150271" y="3578563"/>
+              <a:ext cx="2589266" cy="369332"/>
+            </a:xfrm>
+            <a:prstGeom prst="rect">
+              <a:avLst/>
+            </a:prstGeom>
+            <a:noFill/>
+          </p:spPr>
+          <p:txBody>
+            <a:bodyPr wrap="square" rtlCol="0">
+              <a:spAutoFit/>
+            </a:bodyPr>
+            <a:lstStyle/>
+            <a:p>
+              <a:r>
+                <a:rPr lang="en-US" dirty="0"/>
+                <a:t>Vmax</a:t>
+              </a:r>
+            </a:p>
+          </p:txBody>
+        </p:sp>
+      </p:grpSp>
+      <p:sp>
+        <p:nvSpPr>
+          <p:cNvPr id="14" name="TextBox 13">
+            <a:extLst>
+              <a:ext uri="{FF2B5EF4-FFF2-40B4-BE49-F238E27FC236}">
+                <a16:creationId xmlns:a16="http://schemas.microsoft.com/office/drawing/2014/main" id="{12E411DB-616C-4553-B6C0-79E5273575E9}"/>
+              </a:ext>
+            </a:extLst>
+          </p:cNvPr>
+          <p:cNvSpPr txBox="1"/>
+          <p:nvPr/>
+        </p:nvSpPr>
+        <p:spPr>
+          <a:xfrm flipH="1">
+            <a:off x="7248773" y="0"/>
+            <a:ext cx="2586501" cy="523220"/>
+          </a:xfrm>
+          <a:prstGeom prst="rect">
+            <a:avLst/>
+          </a:prstGeom>
+          <a:noFill/>
+        </p:spPr>
+        <p:txBody>
+          <a:bodyPr wrap="square" rtlCol="0">
+            <a:spAutoFit/>
+          </a:bodyPr>
+          <a:lstStyle/>
+          <a:p>
+            <a:r>
+              <a:rPr lang="en-US" sz="2800" dirty="0"/>
+              <a:t>L=26</a:t>
+            </a:r>
+          </a:p>
+        </p:txBody>
+      </p:sp>
+      <p:sp>
+        <p:nvSpPr>
+          <p:cNvPr id="15" name="TextBox 14">
+            <a:extLst>
+              <a:ext uri="{FF2B5EF4-FFF2-40B4-BE49-F238E27FC236}">
+                <a16:creationId xmlns:a16="http://schemas.microsoft.com/office/drawing/2014/main" id="{E919FD50-18E2-47A8-98BB-6781A0A38C20}"/>
+              </a:ext>
+            </a:extLst>
+          </p:cNvPr>
+          <p:cNvSpPr txBox="1"/>
+          <p:nvPr/>
+        </p:nvSpPr>
+        <p:spPr>
+          <a:xfrm flipH="1">
+            <a:off x="1189509" y="0"/>
+            <a:ext cx="2635898" cy="523220"/>
+          </a:xfrm>
+          <a:prstGeom prst="rect">
+            <a:avLst/>
+          </a:prstGeom>
+          <a:noFill/>
+        </p:spPr>
+        <p:txBody>
+          <a:bodyPr wrap="square" rtlCol="0">
+            <a:spAutoFit/>
+          </a:bodyPr>
+          <a:lstStyle/>
+          <a:p>
+            <a:r>
+              <a:rPr lang="en-US" sz="2800" dirty="0"/>
+              <a:t>L=14</a:t>
+            </a:r>
+          </a:p>
+        </p:txBody>
+      </p:sp>
+      <p:grpSp>
+        <p:nvGrpSpPr>
+          <p:cNvPr id="19" name="Group 18">
+            <a:extLst>
+              <a:ext uri="{FF2B5EF4-FFF2-40B4-BE49-F238E27FC236}">
+                <a16:creationId xmlns:a16="http://schemas.microsoft.com/office/drawing/2014/main" id="{EFC0D9AF-2459-42A4-A092-2ABA5086AD4D}"/>
+              </a:ext>
+            </a:extLst>
+          </p:cNvPr>
+          <p:cNvGrpSpPr/>
+          <p:nvPr/>
+        </p:nvGrpSpPr>
+        <p:grpSpPr>
+          <a:xfrm>
+            <a:off x="7929564" y="6452424"/>
+            <a:ext cx="2648798" cy="379926"/>
+            <a:chOff x="2090739" y="3539393"/>
+            <a:chExt cx="2648798" cy="379926"/>
+          </a:xfrm>
+        </p:grpSpPr>
+        <p:sp>
+          <p:nvSpPr>
+            <p:cNvPr id="20" name="Rectangle 19">
+              <a:extLst>
+                <a:ext uri="{FF2B5EF4-FFF2-40B4-BE49-F238E27FC236}">
+                  <a16:creationId xmlns:a16="http://schemas.microsoft.com/office/drawing/2014/main" id="{7AB822AB-B15F-440D-9C24-0D4FB8C63E3D}"/>
+                </a:ext>
+              </a:extLst>
+            </p:cNvPr>
+            <p:cNvSpPr/>
+            <p:nvPr/>
+          </p:nvSpPr>
+          <p:spPr>
+            <a:xfrm>
+              <a:off x="2090739" y="3539393"/>
+              <a:ext cx="1595282" cy="335446"/>
+            </a:xfrm>
+            <a:prstGeom prst="rect">
+              <a:avLst/>
+            </a:prstGeom>
+            <a:solidFill>
+              <a:schemeClr val="bg1"/>
+            </a:solidFill>
+            <a:ln>
+              <a:solidFill>
+                <a:schemeClr val="bg1"/>
+              </a:solidFill>
+            </a:ln>
+          </p:spPr>
+          <p:style>
+            <a:lnRef idx="2">
+              <a:schemeClr val="accent1">
+                <a:shade val="50000"/>
+              </a:schemeClr>
+            </a:lnRef>
+            <a:fillRef idx="1">
+              <a:schemeClr val="accent1"/>
+            </a:fillRef>
+            <a:effectRef idx="0">
+              <a:schemeClr val="accent1"/>
+            </a:effectRef>
+            <a:fontRef idx="minor">
+              <a:schemeClr val="lt1"/>
+            </a:fontRef>
+          </p:style>
+          <p:txBody>
+            <a:bodyPr rtlCol="0" anchor="ctr"/>
+            <a:lstStyle/>
+            <a:p>
+              <a:pPr algn="ctr"/>
+              <a:endParaRPr lang="en-US"/>
+            </a:p>
+          </p:txBody>
+        </p:sp>
+        <p:sp>
+          <p:nvSpPr>
+            <p:cNvPr id="21" name="TextBox 20">
+              <a:extLst>
+                <a:ext uri="{FF2B5EF4-FFF2-40B4-BE49-F238E27FC236}">
+                  <a16:creationId xmlns:a16="http://schemas.microsoft.com/office/drawing/2014/main" id="{8E34A53B-63EE-4802-80C5-539C4585AE15}"/>
+                </a:ext>
+              </a:extLst>
+            </p:cNvPr>
+            <p:cNvSpPr txBox="1"/>
+            <p:nvPr/>
+          </p:nvSpPr>
+          <p:spPr>
+            <a:xfrm>
+              <a:off x="2150271" y="3549987"/>
+              <a:ext cx="2589266" cy="369332"/>
+            </a:xfrm>
+            <a:prstGeom prst="rect">
+              <a:avLst/>
+            </a:prstGeom>
+            <a:noFill/>
+          </p:spPr>
+          <p:txBody>
+            <a:bodyPr wrap="square" rtlCol="0">
+              <a:spAutoFit/>
+            </a:bodyPr>
+            <a:lstStyle/>
+            <a:p>
+              <a:r>
+                <a:rPr lang="en-US" dirty="0"/>
+                <a:t>Vmax</a:t>
+              </a:r>
+            </a:p>
+          </p:txBody>
+        </p:sp>
+      </p:grpSp>
+      <p:pic>
+        <p:nvPicPr>
+          <p:cNvPr id="25" name="Graphic 24">
+            <a:extLst>
+              <a:ext uri="{FF2B5EF4-FFF2-40B4-BE49-F238E27FC236}">
+                <a16:creationId xmlns:a16="http://schemas.microsoft.com/office/drawing/2014/main" id="{9AF4A0A6-0B4A-47D3-A6F5-12C23EEF904F}"/>
+              </a:ext>
+            </a:extLst>
+          </p:cNvPr>
+          <p:cNvPicPr>
+            <a:picLocks noChangeAspect="1"/>
+          </p:cNvPicPr>
+          <p:nvPr/>
+        </p:nvPicPr>
+        <p:blipFill>
+          <a:blip r:embed="rId8">
+            <a:extLst>
+              <a:ext uri="{28A0092B-C50C-407E-A947-70E740481C1C}">
+                <a14:useLocalDpi xmlns:a14="http://schemas.microsoft.com/office/drawing/2010/main" val="0"/>
+              </a:ext>
+              <a:ext uri="{96DAC541-7B7A-43D3-8B79-37D633B846F1}">
+                <asvg:svgBlip xmlns:asvg="http://schemas.microsoft.com/office/drawing/2016/SVG/main" r:embed="rId9"/>
+              </a:ext>
+            </a:extLst>
+          </a:blip>
+          <a:stretch>
+            <a:fillRect/>
+          </a:stretch>
+        </p:blipFill>
+        <p:spPr>
+          <a:xfrm>
+            <a:off x="75818" y="3913423"/>
+            <a:ext cx="4663719" cy="2553289"/>
+          </a:xfrm>
+          <a:prstGeom prst="rect">
+            <a:avLst/>
+          </a:prstGeom>
+        </p:spPr>
+      </p:pic>
+      <p:grpSp>
+        <p:nvGrpSpPr>
+          <p:cNvPr id="26" name="Group 25">
+            <a:extLst>
+              <a:ext uri="{FF2B5EF4-FFF2-40B4-BE49-F238E27FC236}">
+                <a16:creationId xmlns:a16="http://schemas.microsoft.com/office/drawing/2014/main" id="{619D8C1C-B751-4763-86A7-AEE39D3DAB97}"/>
+              </a:ext>
+            </a:extLst>
+          </p:cNvPr>
+          <p:cNvGrpSpPr/>
+          <p:nvPr/>
+        </p:nvGrpSpPr>
+        <p:grpSpPr>
+          <a:xfrm>
+            <a:off x="2045414" y="6339938"/>
+            <a:ext cx="2648798" cy="379926"/>
+            <a:chOff x="2090739" y="3539393"/>
+            <a:chExt cx="2648798" cy="379926"/>
+          </a:xfrm>
+        </p:grpSpPr>
+        <p:sp>
+          <p:nvSpPr>
+            <p:cNvPr id="27" name="Rectangle 26">
+              <a:extLst>
+                <a:ext uri="{FF2B5EF4-FFF2-40B4-BE49-F238E27FC236}">
+                  <a16:creationId xmlns:a16="http://schemas.microsoft.com/office/drawing/2014/main" id="{91110F1F-DE8F-40BC-ABBA-FA3248D39BB7}"/>
+                </a:ext>
+              </a:extLst>
+            </p:cNvPr>
+            <p:cNvSpPr/>
+            <p:nvPr/>
+          </p:nvSpPr>
+          <p:spPr>
+            <a:xfrm>
+              <a:off x="2090739" y="3539393"/>
+              <a:ext cx="1595282" cy="335446"/>
+            </a:xfrm>
+            <a:prstGeom prst="rect">
+              <a:avLst/>
+            </a:prstGeom>
+            <a:solidFill>
+              <a:schemeClr val="bg1"/>
+            </a:solidFill>
+            <a:ln>
+              <a:solidFill>
+                <a:schemeClr val="bg1"/>
+              </a:solidFill>
+            </a:ln>
+          </p:spPr>
+          <p:style>
+            <a:lnRef idx="2">
+              <a:schemeClr val="accent1">
+                <a:shade val="50000"/>
+              </a:schemeClr>
+            </a:lnRef>
+            <a:fillRef idx="1">
+              <a:schemeClr val="accent1"/>
+            </a:fillRef>
+            <a:effectRef idx="0">
+              <a:schemeClr val="accent1"/>
+            </a:effectRef>
+            <a:fontRef idx="minor">
+              <a:schemeClr val="lt1"/>
+            </a:fontRef>
+          </p:style>
+          <p:txBody>
+            <a:bodyPr rtlCol="0" anchor="ctr"/>
+            <a:lstStyle/>
+            <a:p>
+              <a:pPr algn="ctr"/>
+              <a:endParaRPr lang="en-US"/>
+            </a:p>
+          </p:txBody>
+        </p:sp>
+        <p:sp>
+          <p:nvSpPr>
+            <p:cNvPr id="28" name="TextBox 27">
+              <a:extLst>
+                <a:ext uri="{FF2B5EF4-FFF2-40B4-BE49-F238E27FC236}">
+                  <a16:creationId xmlns:a16="http://schemas.microsoft.com/office/drawing/2014/main" id="{C9C340EC-7932-4525-AB24-FD3403FCAA25}"/>
+                </a:ext>
+              </a:extLst>
+            </p:cNvPr>
+            <p:cNvSpPr txBox="1"/>
+            <p:nvPr/>
+          </p:nvSpPr>
+          <p:spPr>
+            <a:xfrm>
+              <a:off x="2150271" y="3549987"/>
+              <a:ext cx="2589266" cy="369332"/>
+            </a:xfrm>
+            <a:prstGeom prst="rect">
+              <a:avLst/>
+            </a:prstGeom>
+            <a:noFill/>
+          </p:spPr>
+          <p:txBody>
+            <a:bodyPr wrap="square" rtlCol="0">
+              <a:spAutoFit/>
+            </a:bodyPr>
+            <a:lstStyle/>
+            <a:p>
+              <a:r>
+                <a:rPr lang="en-US" dirty="0"/>
+                <a:t>Vmax</a:t>
+              </a:r>
+            </a:p>
+          </p:txBody>
+        </p:sp>
+      </p:grpSp>
+    </p:spTree>
+    <p:extLst>
+      <p:ext uri="{BB962C8B-B14F-4D97-AF65-F5344CB8AC3E}">
+        <p14:creationId xmlns:p14="http://schemas.microsoft.com/office/powerpoint/2010/main" val="3476115428"/>
+      </p:ext>
+    </p:extLst>
+  </p:cSld>
+  <p:clrMapOvr>
+    <a:masterClrMapping/>
+  </p:clrMapOvr>
+</p:sld>
+</file>
+
+<file path=ppt/slides/slide4.xml><?xml version="1.0" encoding="utf-8"?>
+<p:sld xmlns:a="http://schemas.openxmlformats.org/drawingml/2006/main" xmlns:r="http://schemas.openxmlformats.org/officeDocument/2006/relationships" xmlns:p="http://schemas.openxmlformats.org/presentationml/2006/main">
+  <p:cSld>
+    <p:spTree>
+      <p:nvGrpSpPr>
+        <p:cNvPr id="1" name=""/>
+        <p:cNvGrpSpPr/>
+        <p:nvPr/>
+      </p:nvGrpSpPr>
+      <p:grpSpPr>
+        <a:xfrm>
+          <a:off x="0" y="0"/>
+          <a:ext cx="0" cy="0"/>
+          <a:chOff x="0" y="0"/>
+          <a:chExt cx="0" cy="0"/>
+        </a:xfrm>
+      </p:grpSpPr>
+      <p:pic>
+        <p:nvPicPr>
+          <p:cNvPr id="7" name="Graphic 6">
+            <a:extLst>
+              <a:ext uri="{FF2B5EF4-FFF2-40B4-BE49-F238E27FC236}">
+                <a16:creationId xmlns:a16="http://schemas.microsoft.com/office/drawing/2014/main" id="{E4B02C5D-DCA1-419A-AC40-F47CCAE4BD84}"/>
+              </a:ext>
+            </a:extLst>
+          </p:cNvPr>
+          <p:cNvPicPr>
+            <a:picLocks noChangeAspect="1"/>
+          </p:cNvPicPr>
+          <p:nvPr/>
+        </p:nvPicPr>
+        <p:blipFill>
+          <a:blip r:embed="rId2">
+            <a:extLst>
+              <a:ext uri="{28A0092B-C50C-407E-A947-70E740481C1C}">
+                <a14:useLocalDpi xmlns:a14="http://schemas.microsoft.com/office/drawing/2010/main" val="0"/>
+              </a:ext>
+              <a:ext uri="{96DAC541-7B7A-43D3-8B79-37D633B846F1}">
+                <asvg:svgBlip xmlns:asvg="http://schemas.microsoft.com/office/drawing/2016/SVG/main" r:embed="rId3"/>
+              </a:ext>
+            </a:extLst>
+          </a:blip>
+          <a:stretch>
+            <a:fillRect/>
+          </a:stretch>
+        </p:blipFill>
+        <p:spPr>
+          <a:xfrm>
+            <a:off x="1114429" y="0"/>
+            <a:ext cx="4529138" cy="3398701"/>
+          </a:xfrm>
+          <a:prstGeom prst="rect">
+            <a:avLst/>
+          </a:prstGeom>
+        </p:spPr>
+      </p:pic>
+      <p:pic>
+        <p:nvPicPr>
+          <p:cNvPr id="9" name="Graphic 8">
+            <a:extLst>
+              <a:ext uri="{FF2B5EF4-FFF2-40B4-BE49-F238E27FC236}">
+                <a16:creationId xmlns:a16="http://schemas.microsoft.com/office/drawing/2014/main" id="{49A5FFF0-30A9-4BC7-B515-E14BA54FB746}"/>
+              </a:ext>
+            </a:extLst>
+          </p:cNvPr>
+          <p:cNvPicPr>
+            <a:picLocks noChangeAspect="1"/>
+          </p:cNvPicPr>
+          <p:nvPr/>
+        </p:nvPicPr>
+        <p:blipFill>
+          <a:blip r:embed="rId4">
+            <a:extLst>
+              <a:ext uri="{28A0092B-C50C-407E-A947-70E740481C1C}">
+                <a14:useLocalDpi xmlns:a14="http://schemas.microsoft.com/office/drawing/2010/main" val="0"/>
+              </a:ext>
+              <a:ext uri="{96DAC541-7B7A-43D3-8B79-37D633B846F1}">
+                <asvg:svgBlip xmlns:asvg="http://schemas.microsoft.com/office/drawing/2016/SVG/main" r:embed="rId5"/>
+              </a:ext>
+            </a:extLst>
+          </a:blip>
+          <a:stretch>
+            <a:fillRect/>
+          </a:stretch>
+        </p:blipFill>
+        <p:spPr>
+          <a:xfrm>
+            <a:off x="6096000" y="0"/>
+            <a:ext cx="4529139" cy="3398701"/>
+          </a:xfrm>
+          <a:prstGeom prst="rect">
+            <a:avLst/>
+          </a:prstGeom>
+        </p:spPr>
+      </p:pic>
+      <p:pic>
+        <p:nvPicPr>
+          <p:cNvPr id="11" name="Graphic 10">
+            <a:extLst>
+              <a:ext uri="{FF2B5EF4-FFF2-40B4-BE49-F238E27FC236}">
+                <a16:creationId xmlns:a16="http://schemas.microsoft.com/office/drawing/2014/main" id="{B45C62F9-717C-475C-82A5-25757A903169}"/>
+              </a:ext>
+            </a:extLst>
+          </p:cNvPr>
+          <p:cNvPicPr>
+            <a:picLocks noChangeAspect="1"/>
+          </p:cNvPicPr>
+          <p:nvPr/>
+        </p:nvPicPr>
+        <p:blipFill>
+          <a:blip r:embed="rId6">
+            <a:extLst>
+              <a:ext uri="{28A0092B-C50C-407E-A947-70E740481C1C}">
+                <a14:useLocalDpi xmlns:a14="http://schemas.microsoft.com/office/drawing/2010/main" val="0"/>
+              </a:ext>
+              <a:ext uri="{96DAC541-7B7A-43D3-8B79-37D633B846F1}">
+                <asvg:svgBlip xmlns:asvg="http://schemas.microsoft.com/office/drawing/2016/SVG/main" r:embed="rId7"/>
+              </a:ext>
+            </a:extLst>
+          </a:blip>
+          <a:stretch>
+            <a:fillRect/>
+          </a:stretch>
+        </p:blipFill>
+        <p:spPr>
+          <a:xfrm>
+            <a:off x="6096000" y="3459298"/>
+            <a:ext cx="4529140" cy="3398702"/>
+          </a:xfrm>
+          <a:prstGeom prst="rect">
+            <a:avLst/>
+          </a:prstGeom>
+        </p:spPr>
+      </p:pic>
+      <p:pic>
+        <p:nvPicPr>
+          <p:cNvPr id="13" name="Graphic 12">
+            <a:extLst>
+              <a:ext uri="{FF2B5EF4-FFF2-40B4-BE49-F238E27FC236}">
+                <a16:creationId xmlns:a16="http://schemas.microsoft.com/office/drawing/2014/main" id="{6067A416-F9F2-4704-958E-009D7386393A}"/>
+              </a:ext>
+            </a:extLst>
+          </p:cNvPr>
+          <p:cNvPicPr>
+            <a:picLocks noChangeAspect="1"/>
+          </p:cNvPicPr>
+          <p:nvPr/>
+        </p:nvPicPr>
+        <p:blipFill>
+          <a:blip r:embed="rId8">
+            <a:extLst>
+              <a:ext uri="{28A0092B-C50C-407E-A947-70E740481C1C}">
+                <a14:useLocalDpi xmlns:a14="http://schemas.microsoft.com/office/drawing/2010/main" val="0"/>
+              </a:ext>
+              <a:ext uri="{96DAC541-7B7A-43D3-8B79-37D633B846F1}">
+                <asvg:svgBlip xmlns:asvg="http://schemas.microsoft.com/office/drawing/2016/SVG/main" r:embed="rId9"/>
+              </a:ext>
+            </a:extLst>
+          </a:blip>
+          <a:stretch>
+            <a:fillRect/>
+          </a:stretch>
+        </p:blipFill>
+        <p:spPr>
+          <a:xfrm>
+            <a:off x="1114429" y="3459298"/>
+            <a:ext cx="4529138" cy="3398701"/>
+          </a:xfrm>
+          <a:prstGeom prst="rect">
+            <a:avLst/>
+          </a:prstGeom>
+        </p:spPr>
+      </p:pic>
+      <p:grpSp>
+        <p:nvGrpSpPr>
+          <p:cNvPr id="14" name="Group 13">
+            <a:extLst>
+              <a:ext uri="{FF2B5EF4-FFF2-40B4-BE49-F238E27FC236}">
+                <a16:creationId xmlns:a16="http://schemas.microsoft.com/office/drawing/2014/main" id="{18B38FEA-3F1D-4BEF-AC70-32BC86262D3E}"/>
+              </a:ext>
+            </a:extLst>
+          </p:cNvPr>
+          <p:cNvGrpSpPr/>
+          <p:nvPr/>
+        </p:nvGrpSpPr>
+        <p:grpSpPr>
+          <a:xfrm>
+            <a:off x="7976341" y="6668036"/>
+            <a:ext cx="2648798" cy="379926"/>
+            <a:chOff x="2090739" y="3539393"/>
+            <a:chExt cx="2648798" cy="379926"/>
+          </a:xfrm>
+        </p:grpSpPr>
+        <p:sp>
+          <p:nvSpPr>
+            <p:cNvPr id="15" name="Rectangle 14">
+              <a:extLst>
+                <a:ext uri="{FF2B5EF4-FFF2-40B4-BE49-F238E27FC236}">
+                  <a16:creationId xmlns:a16="http://schemas.microsoft.com/office/drawing/2014/main" id="{FA58E6E2-0955-4666-A9B8-6D98C6EBCB95}"/>
+                </a:ext>
+              </a:extLst>
+            </p:cNvPr>
+            <p:cNvSpPr/>
+            <p:nvPr/>
+          </p:nvSpPr>
+          <p:spPr>
+            <a:xfrm>
+              <a:off x="2090739" y="3539393"/>
+              <a:ext cx="1595282" cy="335446"/>
+            </a:xfrm>
+            <a:prstGeom prst="rect">
+              <a:avLst/>
+            </a:prstGeom>
+            <a:solidFill>
+              <a:schemeClr val="bg1"/>
+            </a:solidFill>
+            <a:ln>
+              <a:solidFill>
+                <a:schemeClr val="bg1"/>
+              </a:solidFill>
+            </a:ln>
+          </p:spPr>
+          <p:style>
+            <a:lnRef idx="2">
+              <a:schemeClr val="accent1">
+                <a:shade val="50000"/>
+              </a:schemeClr>
+            </a:lnRef>
+            <a:fillRef idx="1">
+              <a:schemeClr val="accent1"/>
+            </a:fillRef>
+            <a:effectRef idx="0">
+              <a:schemeClr val="accent1"/>
+            </a:effectRef>
+            <a:fontRef idx="minor">
+              <a:schemeClr val="lt1"/>
+            </a:fontRef>
+          </p:style>
+          <p:txBody>
+            <a:bodyPr rtlCol="0" anchor="ctr"/>
+            <a:lstStyle/>
+            <a:p>
+              <a:pPr algn="ctr"/>
+              <a:endParaRPr lang="en-US"/>
+            </a:p>
+          </p:txBody>
+        </p:sp>
+        <p:sp>
+          <p:nvSpPr>
+            <p:cNvPr id="16" name="TextBox 15">
+              <a:extLst>
+                <a:ext uri="{FF2B5EF4-FFF2-40B4-BE49-F238E27FC236}">
+                  <a16:creationId xmlns:a16="http://schemas.microsoft.com/office/drawing/2014/main" id="{93DCB42A-C2E9-4734-B1E7-CB80BADB3FC7}"/>
+                </a:ext>
+              </a:extLst>
+            </p:cNvPr>
+            <p:cNvSpPr txBox="1"/>
+            <p:nvPr/>
+          </p:nvSpPr>
+          <p:spPr>
+            <a:xfrm>
+              <a:off x="2150271" y="3549987"/>
+              <a:ext cx="2589266" cy="369332"/>
+            </a:xfrm>
+            <a:prstGeom prst="rect">
+              <a:avLst/>
+            </a:prstGeom>
+            <a:noFill/>
+          </p:spPr>
+          <p:txBody>
+            <a:bodyPr wrap="square" rtlCol="0">
+              <a:spAutoFit/>
+            </a:bodyPr>
+            <a:lstStyle/>
+            <a:p>
+              <a:r>
+                <a:rPr lang="en-US" dirty="0"/>
+                <a:t>Vmax</a:t>
+              </a:r>
+            </a:p>
+          </p:txBody>
+        </p:sp>
+      </p:grpSp>
+      <p:grpSp>
+        <p:nvGrpSpPr>
+          <p:cNvPr id="17" name="Group 16">
+            <a:extLst>
+              <a:ext uri="{FF2B5EF4-FFF2-40B4-BE49-F238E27FC236}">
+                <a16:creationId xmlns:a16="http://schemas.microsoft.com/office/drawing/2014/main" id="{5C93A41D-ECEE-4612-8BBE-A99B1593A5D2}"/>
+              </a:ext>
+            </a:extLst>
+          </p:cNvPr>
+          <p:cNvGrpSpPr/>
+          <p:nvPr/>
+        </p:nvGrpSpPr>
+        <p:grpSpPr>
+          <a:xfrm>
+            <a:off x="2831729" y="6645796"/>
+            <a:ext cx="2648798" cy="379926"/>
+            <a:chOff x="2090739" y="3539393"/>
+            <a:chExt cx="2648798" cy="379926"/>
+          </a:xfrm>
+        </p:grpSpPr>
+        <p:sp>
+          <p:nvSpPr>
+            <p:cNvPr id="18" name="Rectangle 17">
+              <a:extLst>
+                <a:ext uri="{FF2B5EF4-FFF2-40B4-BE49-F238E27FC236}">
+                  <a16:creationId xmlns:a16="http://schemas.microsoft.com/office/drawing/2014/main" id="{1D5DCBAC-17E0-4E49-946A-0FAEBCFAD0B9}"/>
+                </a:ext>
+              </a:extLst>
+            </p:cNvPr>
+            <p:cNvSpPr/>
+            <p:nvPr/>
+          </p:nvSpPr>
+          <p:spPr>
+            <a:xfrm>
+              <a:off x="2090739" y="3539393"/>
+              <a:ext cx="1595282" cy="335446"/>
+            </a:xfrm>
+            <a:prstGeom prst="rect">
+              <a:avLst/>
+            </a:prstGeom>
+            <a:solidFill>
+              <a:schemeClr val="bg1"/>
+            </a:solidFill>
+            <a:ln>
+              <a:solidFill>
+                <a:schemeClr val="bg1"/>
+              </a:solidFill>
+            </a:ln>
+          </p:spPr>
+          <p:style>
+            <a:lnRef idx="2">
+              <a:schemeClr val="accent1">
+                <a:shade val="50000"/>
+              </a:schemeClr>
+            </a:lnRef>
+            <a:fillRef idx="1">
+              <a:schemeClr val="accent1"/>
+            </a:fillRef>
+            <a:effectRef idx="0">
+              <a:schemeClr val="accent1"/>
+            </a:effectRef>
+            <a:fontRef idx="minor">
+              <a:schemeClr val="lt1"/>
+            </a:fontRef>
+          </p:style>
+          <p:txBody>
+            <a:bodyPr rtlCol="0" anchor="ctr"/>
+            <a:lstStyle/>
+            <a:p>
+              <a:pPr algn="ctr"/>
+              <a:endParaRPr lang="en-US"/>
+            </a:p>
+          </p:txBody>
+        </p:sp>
+        <p:sp>
+          <p:nvSpPr>
+            <p:cNvPr id="19" name="TextBox 18">
+              <a:extLst>
+                <a:ext uri="{FF2B5EF4-FFF2-40B4-BE49-F238E27FC236}">
+                  <a16:creationId xmlns:a16="http://schemas.microsoft.com/office/drawing/2014/main" id="{6817BE2D-CBC1-4BFA-B08F-A2E71FE0CF37}"/>
+                </a:ext>
+              </a:extLst>
+            </p:cNvPr>
+            <p:cNvSpPr txBox="1"/>
+            <p:nvPr/>
+          </p:nvSpPr>
+          <p:spPr>
+            <a:xfrm>
+              <a:off x="2150271" y="3549987"/>
+              <a:ext cx="2589266" cy="369332"/>
+            </a:xfrm>
+            <a:prstGeom prst="rect">
+              <a:avLst/>
+            </a:prstGeom>
+            <a:noFill/>
+          </p:spPr>
+          <p:txBody>
+            <a:bodyPr wrap="square" rtlCol="0">
+              <a:spAutoFit/>
+            </a:bodyPr>
+            <a:lstStyle/>
+            <a:p>
+              <a:r>
+                <a:rPr lang="en-US" dirty="0"/>
+                <a:t>Vmax</a:t>
+              </a:r>
+            </a:p>
+          </p:txBody>
+        </p:sp>
+      </p:grpSp>
+      <p:grpSp>
+        <p:nvGrpSpPr>
+          <p:cNvPr id="20" name="Group 19">
+            <a:extLst>
+              <a:ext uri="{FF2B5EF4-FFF2-40B4-BE49-F238E27FC236}">
+                <a16:creationId xmlns:a16="http://schemas.microsoft.com/office/drawing/2014/main" id="{6EE13007-4852-4445-AE04-28B7F819EA47}"/>
+              </a:ext>
+            </a:extLst>
+          </p:cNvPr>
+          <p:cNvGrpSpPr/>
+          <p:nvPr/>
+        </p:nvGrpSpPr>
+        <p:grpSpPr>
+          <a:xfrm>
+            <a:off x="7976341" y="3208738"/>
+            <a:ext cx="2648798" cy="379926"/>
+            <a:chOff x="2090739" y="3539393"/>
+            <a:chExt cx="2648798" cy="379926"/>
+          </a:xfrm>
+        </p:grpSpPr>
+        <p:sp>
+          <p:nvSpPr>
+            <p:cNvPr id="21" name="Rectangle 20">
+              <a:extLst>
+                <a:ext uri="{FF2B5EF4-FFF2-40B4-BE49-F238E27FC236}">
+                  <a16:creationId xmlns:a16="http://schemas.microsoft.com/office/drawing/2014/main" id="{69AA7E70-2A87-433D-ABDC-4C331E49F0D1}"/>
+                </a:ext>
+              </a:extLst>
+            </p:cNvPr>
+            <p:cNvSpPr/>
+            <p:nvPr/>
+          </p:nvSpPr>
+          <p:spPr>
+            <a:xfrm>
+              <a:off x="2090739" y="3539393"/>
+              <a:ext cx="1595282" cy="335446"/>
+            </a:xfrm>
+            <a:prstGeom prst="rect">
+              <a:avLst/>
+            </a:prstGeom>
+            <a:solidFill>
+              <a:schemeClr val="bg1"/>
+            </a:solidFill>
+            <a:ln>
+              <a:solidFill>
+                <a:schemeClr val="bg1"/>
+              </a:solidFill>
+            </a:ln>
+          </p:spPr>
+          <p:style>
+            <a:lnRef idx="2">
+              <a:schemeClr val="accent1">
+                <a:shade val="50000"/>
+              </a:schemeClr>
+            </a:lnRef>
+            <a:fillRef idx="1">
+              <a:schemeClr val="accent1"/>
+            </a:fillRef>
+            <a:effectRef idx="0">
+              <a:schemeClr val="accent1"/>
+            </a:effectRef>
+            <a:fontRef idx="minor">
+              <a:schemeClr val="lt1"/>
+            </a:fontRef>
+          </p:style>
+          <p:txBody>
+            <a:bodyPr rtlCol="0" anchor="ctr"/>
+            <a:lstStyle/>
+            <a:p>
+              <a:pPr algn="ctr"/>
+              <a:endParaRPr lang="en-US"/>
+            </a:p>
+          </p:txBody>
+        </p:sp>
+        <p:sp>
+          <p:nvSpPr>
+            <p:cNvPr id="22" name="TextBox 21">
+              <a:extLst>
+                <a:ext uri="{FF2B5EF4-FFF2-40B4-BE49-F238E27FC236}">
+                  <a16:creationId xmlns:a16="http://schemas.microsoft.com/office/drawing/2014/main" id="{1F6F1BFC-80B5-4A36-AFC9-205BF3D2A859}"/>
+                </a:ext>
+              </a:extLst>
+            </p:cNvPr>
+            <p:cNvSpPr txBox="1"/>
+            <p:nvPr/>
+          </p:nvSpPr>
+          <p:spPr>
+            <a:xfrm>
+              <a:off x="2150271" y="3549987"/>
+              <a:ext cx="2589266" cy="369332"/>
+            </a:xfrm>
+            <a:prstGeom prst="rect">
+              <a:avLst/>
+            </a:prstGeom>
+            <a:noFill/>
+          </p:spPr>
+          <p:txBody>
+            <a:bodyPr wrap="square" rtlCol="0">
+              <a:spAutoFit/>
+            </a:bodyPr>
+            <a:lstStyle/>
+            <a:p>
+              <a:r>
+                <a:rPr lang="en-US" dirty="0"/>
+                <a:t>Vmax</a:t>
+              </a:r>
+            </a:p>
+          </p:txBody>
+        </p:sp>
+      </p:grpSp>
+      <p:grpSp>
+        <p:nvGrpSpPr>
+          <p:cNvPr id="23" name="Group 22">
+            <a:extLst>
+              <a:ext uri="{FF2B5EF4-FFF2-40B4-BE49-F238E27FC236}">
+                <a16:creationId xmlns:a16="http://schemas.microsoft.com/office/drawing/2014/main" id="{3F518BC2-153E-49C1-82D7-1B74C536BACA}"/>
+              </a:ext>
+            </a:extLst>
+          </p:cNvPr>
+          <p:cNvGrpSpPr/>
+          <p:nvPr/>
+        </p:nvGrpSpPr>
+        <p:grpSpPr>
+          <a:xfrm>
+            <a:off x="2831729" y="3238045"/>
+            <a:ext cx="2648798" cy="379926"/>
+            <a:chOff x="2090739" y="3539393"/>
+            <a:chExt cx="2648798" cy="379926"/>
+          </a:xfrm>
+        </p:grpSpPr>
+        <p:sp>
+          <p:nvSpPr>
+            <p:cNvPr id="24" name="Rectangle 23">
+              <a:extLst>
+                <a:ext uri="{FF2B5EF4-FFF2-40B4-BE49-F238E27FC236}">
+                  <a16:creationId xmlns:a16="http://schemas.microsoft.com/office/drawing/2014/main" id="{3AB21E92-8514-4882-91D5-7D50D6AB85D1}"/>
+                </a:ext>
+              </a:extLst>
+            </p:cNvPr>
+            <p:cNvSpPr/>
+            <p:nvPr/>
+          </p:nvSpPr>
+          <p:spPr>
+            <a:xfrm>
+              <a:off x="2090739" y="3539393"/>
+              <a:ext cx="1595282" cy="335446"/>
+            </a:xfrm>
+            <a:prstGeom prst="rect">
+              <a:avLst/>
+            </a:prstGeom>
+            <a:solidFill>
+              <a:schemeClr val="bg1"/>
+            </a:solidFill>
+            <a:ln>
+              <a:solidFill>
+                <a:schemeClr val="bg1"/>
+              </a:solidFill>
+            </a:ln>
+          </p:spPr>
+          <p:style>
+            <a:lnRef idx="2">
+              <a:schemeClr val="accent1">
+                <a:shade val="50000"/>
+              </a:schemeClr>
+            </a:lnRef>
+            <a:fillRef idx="1">
+              <a:schemeClr val="accent1"/>
+            </a:fillRef>
+            <a:effectRef idx="0">
+              <a:schemeClr val="accent1"/>
+            </a:effectRef>
+            <a:fontRef idx="minor">
+              <a:schemeClr val="lt1"/>
+            </a:fontRef>
+          </p:style>
+          <p:txBody>
+            <a:bodyPr rtlCol="0" anchor="ctr"/>
+            <a:lstStyle/>
+            <a:p>
+              <a:pPr algn="ctr"/>
+              <a:endParaRPr lang="en-US"/>
+            </a:p>
+          </p:txBody>
+        </p:sp>
+        <p:sp>
+          <p:nvSpPr>
+            <p:cNvPr id="25" name="TextBox 24">
+              <a:extLst>
+                <a:ext uri="{FF2B5EF4-FFF2-40B4-BE49-F238E27FC236}">
+                  <a16:creationId xmlns:a16="http://schemas.microsoft.com/office/drawing/2014/main" id="{9E1418B4-2670-4DF9-896A-2B8CCECAA467}"/>
+                </a:ext>
+              </a:extLst>
+            </p:cNvPr>
+            <p:cNvSpPr txBox="1"/>
+            <p:nvPr/>
+          </p:nvSpPr>
+          <p:spPr>
+            <a:xfrm>
+              <a:off x="2150271" y="3549987"/>
+              <a:ext cx="2589266" cy="369332"/>
+            </a:xfrm>
+            <a:prstGeom prst="rect">
+              <a:avLst/>
+            </a:prstGeom>
+            <a:noFill/>
+          </p:spPr>
+          <p:txBody>
+            <a:bodyPr wrap="square" rtlCol="0">
+              <a:spAutoFit/>
+            </a:bodyPr>
+            <a:lstStyle/>
+            <a:p>
+              <a:r>
+                <a:rPr lang="en-US" dirty="0"/>
+                <a:t>Vmax</a:t>
+              </a:r>
+            </a:p>
+          </p:txBody>
+        </p:sp>
+      </p:grpSp>
+      <p:grpSp>
+        <p:nvGrpSpPr>
+          <p:cNvPr id="30" name="Group 29">
+            <a:extLst>
+              <a:ext uri="{FF2B5EF4-FFF2-40B4-BE49-F238E27FC236}">
+                <a16:creationId xmlns:a16="http://schemas.microsoft.com/office/drawing/2014/main" id="{52CA2D86-0DB7-42BD-8EF7-6C1E4FD48A48}"/>
+              </a:ext>
+            </a:extLst>
+          </p:cNvPr>
+          <p:cNvGrpSpPr/>
+          <p:nvPr/>
+        </p:nvGrpSpPr>
+        <p:grpSpPr>
+          <a:xfrm>
+            <a:off x="933428" y="4363279"/>
+            <a:ext cx="557212" cy="1345601"/>
+            <a:chOff x="519125" y="3123852"/>
+            <a:chExt cx="557212" cy="1345601"/>
+          </a:xfrm>
+        </p:grpSpPr>
+        <p:sp>
+          <p:nvSpPr>
+            <p:cNvPr id="26" name="Rectangle 25">
+              <a:extLst>
+                <a:ext uri="{FF2B5EF4-FFF2-40B4-BE49-F238E27FC236}">
+                  <a16:creationId xmlns:a16="http://schemas.microsoft.com/office/drawing/2014/main" id="{B6307DDC-4656-418A-95C5-759C50F2F99D}"/>
+                </a:ext>
+              </a:extLst>
+            </p:cNvPr>
+            <p:cNvSpPr/>
+            <p:nvPr/>
+          </p:nvSpPr>
+          <p:spPr>
+            <a:xfrm>
+              <a:off x="519125" y="3291575"/>
+              <a:ext cx="557212" cy="1177878"/>
+            </a:xfrm>
+            <a:prstGeom prst="rect">
+              <a:avLst/>
+            </a:prstGeom>
+            <a:solidFill>
+              <a:schemeClr val="bg1"/>
+            </a:solidFill>
+            <a:ln>
+              <a:solidFill>
+                <a:schemeClr val="bg1"/>
+              </a:solidFill>
+            </a:ln>
+          </p:spPr>
+          <p:style>
+            <a:lnRef idx="2">
+              <a:schemeClr val="accent1">
+                <a:shade val="50000"/>
+              </a:schemeClr>
+            </a:lnRef>
+            <a:fillRef idx="1">
+              <a:schemeClr val="accent1"/>
+            </a:fillRef>
+            <a:effectRef idx="0">
+              <a:schemeClr val="accent1"/>
+            </a:effectRef>
+            <a:fontRef idx="minor">
+              <a:schemeClr val="lt1"/>
+            </a:fontRef>
+          </p:style>
+          <p:txBody>
+            <a:bodyPr rtlCol="0" anchor="ctr"/>
+            <a:lstStyle/>
+            <a:p>
+              <a:pPr algn="ctr"/>
+              <a:endParaRPr lang="en-US"/>
+            </a:p>
+          </p:txBody>
+        </p:sp>
+        <p:sp>
+          <p:nvSpPr>
+            <p:cNvPr id="27" name="TextBox 26">
+              <a:extLst>
+                <a:ext uri="{FF2B5EF4-FFF2-40B4-BE49-F238E27FC236}">
+                  <a16:creationId xmlns:a16="http://schemas.microsoft.com/office/drawing/2014/main" id="{AB160202-3E52-48B7-B6A4-C22BA5F01514}"/>
+                </a:ext>
+              </a:extLst>
+            </p:cNvPr>
+            <p:cNvSpPr txBox="1"/>
+            <p:nvPr/>
+          </p:nvSpPr>
+          <p:spPr>
+            <a:xfrm rot="16200000">
+              <a:off x="198280" y="3589868"/>
+              <a:ext cx="1332142" cy="400110"/>
+            </a:xfrm>
+            <a:prstGeom prst="rect">
+              <a:avLst/>
+            </a:prstGeom>
+            <a:noFill/>
+          </p:spPr>
+          <p:txBody>
+            <a:bodyPr wrap="square" rtlCol="0">
+              <a:spAutoFit/>
+            </a:bodyPr>
+            <a:lstStyle/>
+            <a:p>
+              <a:r>
+                <a:rPr lang="en-US" sz="2000" dirty="0"/>
+                <a:t>Lap Error</a:t>
+              </a:r>
+            </a:p>
+          </p:txBody>
+        </p:sp>
+      </p:grpSp>
+      <p:grpSp>
+        <p:nvGrpSpPr>
+          <p:cNvPr id="31" name="Group 30">
+            <a:extLst>
+              <a:ext uri="{FF2B5EF4-FFF2-40B4-BE49-F238E27FC236}">
+                <a16:creationId xmlns:a16="http://schemas.microsoft.com/office/drawing/2014/main" id="{E12C1C1A-8003-45B4-B993-EF9E1AB923FD}"/>
+              </a:ext>
+            </a:extLst>
+          </p:cNvPr>
+          <p:cNvGrpSpPr/>
+          <p:nvPr/>
+        </p:nvGrpSpPr>
+        <p:grpSpPr>
+          <a:xfrm>
+            <a:off x="739677" y="1194272"/>
+            <a:ext cx="557212" cy="1345601"/>
+            <a:chOff x="519125" y="3123852"/>
+            <a:chExt cx="557212" cy="1345601"/>
+          </a:xfrm>
+        </p:grpSpPr>
+        <p:sp>
+          <p:nvSpPr>
+            <p:cNvPr id="32" name="Rectangle 31">
+              <a:extLst>
+                <a:ext uri="{FF2B5EF4-FFF2-40B4-BE49-F238E27FC236}">
+                  <a16:creationId xmlns:a16="http://schemas.microsoft.com/office/drawing/2014/main" id="{2192ECCE-D94C-4679-9439-193AEAA8B247}"/>
+                </a:ext>
+              </a:extLst>
+            </p:cNvPr>
+            <p:cNvSpPr/>
+            <p:nvPr/>
+          </p:nvSpPr>
+          <p:spPr>
+            <a:xfrm>
+              <a:off x="519125" y="3291575"/>
+              <a:ext cx="557212" cy="1177878"/>
+            </a:xfrm>
+            <a:prstGeom prst="rect">
+              <a:avLst/>
+            </a:prstGeom>
+            <a:solidFill>
+              <a:schemeClr val="bg1"/>
+            </a:solidFill>
+            <a:ln>
+              <a:solidFill>
+                <a:schemeClr val="bg1"/>
+              </a:solidFill>
+            </a:ln>
+          </p:spPr>
+          <p:style>
+            <a:lnRef idx="2">
+              <a:schemeClr val="accent1">
+                <a:shade val="50000"/>
+              </a:schemeClr>
+            </a:lnRef>
+            <a:fillRef idx="1">
+              <a:schemeClr val="accent1"/>
+            </a:fillRef>
+            <a:effectRef idx="0">
+              <a:schemeClr val="accent1"/>
+            </a:effectRef>
+            <a:fontRef idx="minor">
+              <a:schemeClr val="lt1"/>
+            </a:fontRef>
+          </p:style>
+          <p:txBody>
+            <a:bodyPr rtlCol="0" anchor="ctr"/>
+            <a:lstStyle/>
+            <a:p>
+              <a:pPr algn="ctr"/>
+              <a:endParaRPr lang="en-US"/>
+            </a:p>
+          </p:txBody>
+        </p:sp>
+        <p:sp>
+          <p:nvSpPr>
+            <p:cNvPr id="33" name="TextBox 32">
+              <a:extLst>
+                <a:ext uri="{FF2B5EF4-FFF2-40B4-BE49-F238E27FC236}">
+                  <a16:creationId xmlns:a16="http://schemas.microsoft.com/office/drawing/2014/main" id="{49D0F5A5-7EC0-4D93-9E9F-0B15B477CA92}"/>
+                </a:ext>
+              </a:extLst>
+            </p:cNvPr>
+            <p:cNvSpPr txBox="1"/>
+            <p:nvPr/>
+          </p:nvSpPr>
+          <p:spPr>
+            <a:xfrm rot="16200000">
+              <a:off x="198280" y="3589868"/>
+              <a:ext cx="1332142" cy="400110"/>
+            </a:xfrm>
+            <a:prstGeom prst="rect">
+              <a:avLst/>
+            </a:prstGeom>
+            <a:noFill/>
+          </p:spPr>
+          <p:txBody>
+            <a:bodyPr wrap="square" rtlCol="0">
+              <a:spAutoFit/>
+            </a:bodyPr>
+            <a:lstStyle/>
+            <a:p>
+              <a:r>
+                <a:rPr lang="en-US" sz="2000" dirty="0"/>
+                <a:t>Lap Error</a:t>
+              </a:r>
+            </a:p>
+          </p:txBody>
+        </p:sp>
+      </p:grpSp>
+      <p:grpSp>
+        <p:nvGrpSpPr>
+          <p:cNvPr id="34" name="Group 33">
+            <a:extLst>
+              <a:ext uri="{FF2B5EF4-FFF2-40B4-BE49-F238E27FC236}">
+                <a16:creationId xmlns:a16="http://schemas.microsoft.com/office/drawing/2014/main" id="{A7E9CA49-D0A8-49C2-8CF0-D27B48DC5462}"/>
+              </a:ext>
+            </a:extLst>
+          </p:cNvPr>
+          <p:cNvGrpSpPr/>
+          <p:nvPr/>
+        </p:nvGrpSpPr>
+        <p:grpSpPr>
+          <a:xfrm>
+            <a:off x="5695846" y="585788"/>
+            <a:ext cx="557212" cy="1786362"/>
+            <a:chOff x="519125" y="2683091"/>
+            <a:chExt cx="557212" cy="1786362"/>
+          </a:xfrm>
+        </p:grpSpPr>
+        <p:sp>
+          <p:nvSpPr>
+            <p:cNvPr id="35" name="Rectangle 34">
+              <a:extLst>
+                <a:ext uri="{FF2B5EF4-FFF2-40B4-BE49-F238E27FC236}">
+                  <a16:creationId xmlns:a16="http://schemas.microsoft.com/office/drawing/2014/main" id="{92932374-E300-4260-89DC-A8BE79CA8115}"/>
+                </a:ext>
+              </a:extLst>
+            </p:cNvPr>
+            <p:cNvSpPr/>
+            <p:nvPr/>
+          </p:nvSpPr>
+          <p:spPr>
+            <a:xfrm>
+              <a:off x="519125" y="3291575"/>
+              <a:ext cx="557212" cy="1177878"/>
+            </a:xfrm>
+            <a:prstGeom prst="rect">
+              <a:avLst/>
+            </a:prstGeom>
+            <a:solidFill>
+              <a:schemeClr val="bg1"/>
+            </a:solidFill>
+            <a:ln>
+              <a:solidFill>
+                <a:schemeClr val="bg1"/>
+              </a:solidFill>
+            </a:ln>
+          </p:spPr>
+          <p:style>
+            <a:lnRef idx="2">
+              <a:schemeClr val="accent1">
+                <a:shade val="50000"/>
+              </a:schemeClr>
+            </a:lnRef>
+            <a:fillRef idx="1">
+              <a:schemeClr val="accent1"/>
+            </a:fillRef>
+            <a:effectRef idx="0">
+              <a:schemeClr val="accent1"/>
+            </a:effectRef>
+            <a:fontRef idx="minor">
+              <a:schemeClr val="lt1"/>
+            </a:fontRef>
+          </p:style>
+          <p:txBody>
+            <a:bodyPr rtlCol="0" anchor="ctr"/>
+            <a:lstStyle/>
+            <a:p>
+              <a:pPr algn="ctr"/>
+              <a:endParaRPr lang="en-US"/>
+            </a:p>
+          </p:txBody>
+        </p:sp>
+        <p:sp>
+          <p:nvSpPr>
+            <p:cNvPr id="36" name="TextBox 35">
+              <a:extLst>
+                <a:ext uri="{FF2B5EF4-FFF2-40B4-BE49-F238E27FC236}">
+                  <a16:creationId xmlns:a16="http://schemas.microsoft.com/office/drawing/2014/main" id="{AEDA4665-79D0-4B7E-8B5B-90F0AA427E99}"/>
+                </a:ext>
+              </a:extLst>
+            </p:cNvPr>
+            <p:cNvSpPr txBox="1"/>
+            <p:nvPr/>
+          </p:nvSpPr>
+          <p:spPr>
+            <a:xfrm rot="16200000">
+              <a:off x="-22101" y="3369488"/>
+              <a:ext cx="1772903" cy="400110"/>
+            </a:xfrm>
+            <a:prstGeom prst="rect">
+              <a:avLst/>
+            </a:prstGeom>
+            <a:noFill/>
+          </p:spPr>
+          <p:txBody>
+            <a:bodyPr wrap="square" rtlCol="0">
+              <a:spAutoFit/>
+            </a:bodyPr>
+            <a:lstStyle/>
+            <a:p>
+              <a:r>
+                <a:rPr lang="en-US" sz="2000" dirty="0"/>
+                <a:t>Parity Error</a:t>
+              </a:r>
+            </a:p>
+          </p:txBody>
+        </p:sp>
+      </p:grpSp>
+      <p:grpSp>
+        <p:nvGrpSpPr>
+          <p:cNvPr id="37" name="Group 36">
+            <a:extLst>
+              <a:ext uri="{FF2B5EF4-FFF2-40B4-BE49-F238E27FC236}">
+                <a16:creationId xmlns:a16="http://schemas.microsoft.com/office/drawing/2014/main" id="{D93A5919-5237-4E6F-978E-7E26BAE7055E}"/>
+              </a:ext>
+            </a:extLst>
+          </p:cNvPr>
+          <p:cNvGrpSpPr/>
+          <p:nvPr/>
+        </p:nvGrpSpPr>
+        <p:grpSpPr>
+          <a:xfrm>
+            <a:off x="5864748" y="3957638"/>
+            <a:ext cx="557212" cy="1813213"/>
+            <a:chOff x="519125" y="2656240"/>
+            <a:chExt cx="557212" cy="1813213"/>
+          </a:xfrm>
+        </p:grpSpPr>
+        <p:sp>
+          <p:nvSpPr>
+            <p:cNvPr id="38" name="Rectangle 37">
+              <a:extLst>
+                <a:ext uri="{FF2B5EF4-FFF2-40B4-BE49-F238E27FC236}">
+                  <a16:creationId xmlns:a16="http://schemas.microsoft.com/office/drawing/2014/main" id="{F238320E-5A88-4F15-9D78-6786029C0D09}"/>
+                </a:ext>
+              </a:extLst>
+            </p:cNvPr>
+            <p:cNvSpPr/>
+            <p:nvPr/>
+          </p:nvSpPr>
+          <p:spPr>
+            <a:xfrm>
+              <a:off x="519125" y="3291575"/>
+              <a:ext cx="557212" cy="1177878"/>
+            </a:xfrm>
+            <a:prstGeom prst="rect">
+              <a:avLst/>
+            </a:prstGeom>
+            <a:solidFill>
+              <a:schemeClr val="bg1"/>
+            </a:solidFill>
+            <a:ln>
+              <a:solidFill>
+                <a:schemeClr val="bg1"/>
+              </a:solidFill>
+            </a:ln>
+          </p:spPr>
+          <p:style>
+            <a:lnRef idx="2">
+              <a:schemeClr val="accent1">
+                <a:shade val="50000"/>
+              </a:schemeClr>
+            </a:lnRef>
+            <a:fillRef idx="1">
+              <a:schemeClr val="accent1"/>
+            </a:fillRef>
+            <a:effectRef idx="0">
+              <a:schemeClr val="accent1"/>
+            </a:effectRef>
+            <a:fontRef idx="minor">
+              <a:schemeClr val="lt1"/>
+            </a:fontRef>
+          </p:style>
+          <p:txBody>
+            <a:bodyPr rtlCol="0" anchor="ctr"/>
+            <a:lstStyle/>
+            <a:p>
+              <a:pPr algn="ctr"/>
+              <a:endParaRPr lang="en-US"/>
+            </a:p>
+          </p:txBody>
+        </p:sp>
+        <p:sp>
+          <p:nvSpPr>
+            <p:cNvPr id="39" name="TextBox 38">
+              <a:extLst>
+                <a:ext uri="{FF2B5EF4-FFF2-40B4-BE49-F238E27FC236}">
+                  <a16:creationId xmlns:a16="http://schemas.microsoft.com/office/drawing/2014/main" id="{33200302-1D5C-455A-B6C6-5C448E497D72}"/>
+                </a:ext>
+              </a:extLst>
+            </p:cNvPr>
+            <p:cNvSpPr txBox="1"/>
+            <p:nvPr/>
+          </p:nvSpPr>
+          <p:spPr>
+            <a:xfrm rot="16200000">
+              <a:off x="-35526" y="3356062"/>
+              <a:ext cx="1799754" cy="400110"/>
+            </a:xfrm>
+            <a:prstGeom prst="rect">
+              <a:avLst/>
+            </a:prstGeom>
+            <a:noFill/>
+          </p:spPr>
+          <p:txBody>
+            <a:bodyPr wrap="square" rtlCol="0">
+              <a:spAutoFit/>
+            </a:bodyPr>
+            <a:lstStyle/>
+            <a:p>
+              <a:r>
+                <a:rPr lang="en-US" sz="2000" dirty="0"/>
+                <a:t>Parity Error</a:t>
+              </a:r>
+            </a:p>
+          </p:txBody>
+        </p:sp>
+      </p:grpSp>
+      <p:sp>
+        <p:nvSpPr>
+          <p:cNvPr id="40" name="TextBox 39">
+            <a:extLst>
+              <a:ext uri="{FF2B5EF4-FFF2-40B4-BE49-F238E27FC236}">
+                <a16:creationId xmlns:a16="http://schemas.microsoft.com/office/drawing/2014/main" id="{EA3B11AD-9C2D-456A-976C-0EE0F87222C1}"/>
+              </a:ext>
+            </a:extLst>
+          </p:cNvPr>
+          <p:cNvSpPr txBox="1"/>
+          <p:nvPr/>
+        </p:nvSpPr>
+        <p:spPr>
+          <a:xfrm>
+            <a:off x="200025" y="128588"/>
+            <a:ext cx="1256979" cy="461665"/>
+          </a:xfrm>
+          <a:prstGeom prst="rect">
+            <a:avLst/>
+          </a:prstGeom>
+          <a:noFill/>
+        </p:spPr>
+        <p:txBody>
+          <a:bodyPr wrap="square" rtlCol="0">
+            <a:spAutoFit/>
+          </a:bodyPr>
+          <a:lstStyle/>
+          <a:p>
+            <a:r>
+              <a:rPr lang="en-US" sz="2400" dirty="0"/>
+              <a:t>L=26</a:t>
+            </a:r>
+          </a:p>
+        </p:txBody>
+      </p:sp>
+    </p:spTree>
+    <p:extLst>
+      <p:ext uri="{BB962C8B-B14F-4D97-AF65-F5344CB8AC3E}">
+        <p14:creationId xmlns:p14="http://schemas.microsoft.com/office/powerpoint/2010/main" val="965506378"/>
+      </p:ext>
+    </p:extLst>
+  </p:cSld>
+  <p:clrMapOvr>
+    <a:masterClrMapping/>
+  </p:clrMapOvr>
+</p:sld>
+</file>
+
+<file path=ppt/slides/slide5.xml><?xml version="1.0" encoding="utf-8"?>
+<p:sld xmlns:a="http://schemas.openxmlformats.org/drawingml/2006/main" xmlns:r="http://schemas.openxmlformats.org/officeDocument/2006/relationships" xmlns:p="http://schemas.openxmlformats.org/presentationml/2006/main">
+  <p:cSld>
+    <p:spTree>
+      <p:nvGrpSpPr>
+        <p:cNvPr id="1" name=""/>
+        <p:cNvGrpSpPr/>
+        <p:nvPr/>
+      </p:nvGrpSpPr>
+      <p:grpSpPr>
+        <a:xfrm>
+          <a:off x="0" y="0"/>
+          <a:ext cx="0" cy="0"/>
+          <a:chOff x="0" y="0"/>
+          <a:chExt cx="0" cy="0"/>
+        </a:xfrm>
+      </p:grpSpPr>
+      <p:pic>
+        <p:nvPicPr>
+          <p:cNvPr id="5" name="Graphic 4">
+            <a:extLst>
+              <a:ext uri="{FF2B5EF4-FFF2-40B4-BE49-F238E27FC236}">
+                <a16:creationId xmlns:a16="http://schemas.microsoft.com/office/drawing/2014/main" id="{FF4AD9C0-3B2D-4341-BF58-0ED35FCEA0BA}"/>
+              </a:ext>
+            </a:extLst>
+          </p:cNvPr>
+          <p:cNvPicPr>
+            <a:picLocks noChangeAspect="1"/>
+          </p:cNvPicPr>
+          <p:nvPr/>
+        </p:nvPicPr>
+        <p:blipFill>
+          <a:blip r:embed="rId2">
+            <a:extLst>
+              <a:ext uri="{28A0092B-C50C-407E-A947-70E740481C1C}">
+                <a14:useLocalDpi xmlns:a14="http://schemas.microsoft.com/office/drawing/2010/main" val="0"/>
+              </a:ext>
+              <a:ext uri="{96DAC541-7B7A-43D3-8B79-37D633B846F1}">
+                <asvg:svgBlip xmlns:asvg="http://schemas.microsoft.com/office/drawing/2016/SVG/main" r:embed="rId3"/>
+              </a:ext>
+            </a:extLst>
+          </a:blip>
+          <a:stretch>
+            <a:fillRect/>
+          </a:stretch>
+        </p:blipFill>
+        <p:spPr>
+          <a:xfrm>
+            <a:off x="8358188" y="457209"/>
+            <a:ext cx="4090987" cy="3069909"/>
+          </a:xfrm>
+          <a:prstGeom prst="rect">
+            <a:avLst/>
+          </a:prstGeom>
+        </p:spPr>
+      </p:pic>
+      <p:pic>
+        <p:nvPicPr>
+          <p:cNvPr id="7" name="Graphic 6">
+            <a:extLst>
+              <a:ext uri="{FF2B5EF4-FFF2-40B4-BE49-F238E27FC236}">
+                <a16:creationId xmlns:a16="http://schemas.microsoft.com/office/drawing/2014/main" id="{2A7C8854-4358-4124-9780-86F440D9F0E9}"/>
+              </a:ext>
+            </a:extLst>
+          </p:cNvPr>
+          <p:cNvPicPr>
+            <a:picLocks noChangeAspect="1"/>
+          </p:cNvPicPr>
+          <p:nvPr/>
+        </p:nvPicPr>
+        <p:blipFill>
+          <a:blip r:embed="rId4">
+            <a:extLst>
+              <a:ext uri="{28A0092B-C50C-407E-A947-70E740481C1C}">
+                <a14:useLocalDpi xmlns:a14="http://schemas.microsoft.com/office/drawing/2010/main" val="0"/>
+              </a:ext>
+              <a:ext uri="{96DAC541-7B7A-43D3-8B79-37D633B846F1}">
+                <asvg:svgBlip xmlns:asvg="http://schemas.microsoft.com/office/drawing/2016/SVG/main" r:embed="rId5"/>
+              </a:ext>
+            </a:extLst>
+          </a:blip>
+          <a:stretch>
+            <a:fillRect/>
+          </a:stretch>
+        </p:blipFill>
+        <p:spPr>
+          <a:xfrm>
+            <a:off x="0" y="457209"/>
+            <a:ext cx="4090987" cy="3069909"/>
+          </a:xfrm>
+          <a:prstGeom prst="rect">
+            <a:avLst/>
+          </a:prstGeom>
+        </p:spPr>
+      </p:pic>
+      <p:pic>
+        <p:nvPicPr>
+          <p:cNvPr id="9" name="Graphic 8">
+            <a:extLst>
+              <a:ext uri="{FF2B5EF4-FFF2-40B4-BE49-F238E27FC236}">
+                <a16:creationId xmlns:a16="http://schemas.microsoft.com/office/drawing/2014/main" id="{E725C996-51E7-407F-9AD9-806D23A55EE8}"/>
+              </a:ext>
+            </a:extLst>
+          </p:cNvPr>
+          <p:cNvPicPr>
+            <a:picLocks noChangeAspect="1"/>
+          </p:cNvPicPr>
+          <p:nvPr/>
+        </p:nvPicPr>
+        <p:blipFill>
+          <a:blip r:embed="rId6">
+            <a:extLst>
+              <a:ext uri="{28A0092B-C50C-407E-A947-70E740481C1C}">
+                <a14:useLocalDpi xmlns:a14="http://schemas.microsoft.com/office/drawing/2010/main" val="0"/>
+              </a:ext>
+              <a:ext uri="{96DAC541-7B7A-43D3-8B79-37D633B846F1}">
+                <asvg:svgBlip xmlns:asvg="http://schemas.microsoft.com/office/drawing/2016/SVG/main" r:embed="rId7"/>
+              </a:ext>
+            </a:extLst>
+          </a:blip>
+          <a:stretch>
+            <a:fillRect/>
+          </a:stretch>
+        </p:blipFill>
+        <p:spPr>
+          <a:xfrm>
+            <a:off x="4090987" y="457209"/>
+            <a:ext cx="4267201" cy="3202141"/>
+          </a:xfrm>
+          <a:prstGeom prst="rect">
+            <a:avLst/>
+          </a:prstGeom>
+        </p:spPr>
+      </p:pic>
+      <p:sp>
+        <p:nvSpPr>
+          <p:cNvPr id="10" name="TextBox 9">
+            <a:extLst>
+              <a:ext uri="{FF2B5EF4-FFF2-40B4-BE49-F238E27FC236}">
+                <a16:creationId xmlns:a16="http://schemas.microsoft.com/office/drawing/2014/main" id="{9B67F032-8BDB-4198-95C9-0B0ED1828A7E}"/>
+              </a:ext>
+            </a:extLst>
+          </p:cNvPr>
+          <p:cNvSpPr txBox="1"/>
+          <p:nvPr/>
+        </p:nvSpPr>
+        <p:spPr>
+          <a:xfrm>
+            <a:off x="114300" y="45577"/>
+            <a:ext cx="2343150" cy="523220"/>
+          </a:xfrm>
+          <a:prstGeom prst="rect">
+            <a:avLst/>
+          </a:prstGeom>
+          <a:noFill/>
+        </p:spPr>
+        <p:txBody>
+          <a:bodyPr wrap="square" rtlCol="0">
+            <a:spAutoFit/>
+          </a:bodyPr>
+          <a:lstStyle/>
+          <a:p>
+            <a:r>
+              <a:rPr lang="en-US" sz="2800" dirty="0"/>
+              <a:t>L=14</a:t>
+            </a:r>
+          </a:p>
+        </p:txBody>
+      </p:sp>
+    </p:spTree>
+    <p:extLst>
+      <p:ext uri="{BB962C8B-B14F-4D97-AF65-F5344CB8AC3E}">
+        <p14:creationId xmlns:p14="http://schemas.microsoft.com/office/powerpoint/2010/main" val="3819542966"/>
+      </p:ext>
+    </p:extLst>
+  </p:cSld>
+  <p:clrMapOvr>
+    <a:masterClrMapping/>
+  </p:clrMapOvr>
+</p:sld>
+</file>
+
 <file path=ppt/theme/theme1.xml><?xml version="1.0" encoding="utf-8"?>
 <a:theme xmlns:a="http://schemas.openxmlformats.org/drawingml/2006/main" name="Office Theme">
   <a:themeElements>

</xml_diff>

<commit_message>
some bond dimension data
</commit_message>
<xml_diff>
--- a/plotting_and_data/zzx_L26.pptx
+++ b/plotting_and_data/zzx_L26.pptx
@@ -10,6 +10,7 @@
     <p:sldId id="258" r:id="rId4"/>
     <p:sldId id="259" r:id="rId5"/>
     <p:sldId id="260" r:id="rId6"/>
+    <p:sldId id="261" r:id="rId7"/>
   </p:sldIdLst>
   <p:sldSz cx="12192000" cy="6858000"/>
   <p:notesSz cx="6858000" cy="9144000"/>
@@ -263,7 +264,7 @@
           <a:p>
             <a:fld id="{2B3C3A7C-569B-4175-B09F-B289B3E9820E}" type="datetimeFigureOut">
               <a:rPr lang="en-US" smtClean="0"/>
-              <a:t>10/22/2019</a:t>
+              <a:t>10/23/2019</a:t>
             </a:fld>
             <a:endParaRPr lang="en-US"/>
           </a:p>
@@ -461,7 +462,7 @@
           <a:p>
             <a:fld id="{2B3C3A7C-569B-4175-B09F-B289B3E9820E}" type="datetimeFigureOut">
               <a:rPr lang="en-US" smtClean="0"/>
-              <a:t>10/22/2019</a:t>
+              <a:t>10/23/2019</a:t>
             </a:fld>
             <a:endParaRPr lang="en-US"/>
           </a:p>
@@ -669,7 +670,7 @@
           <a:p>
             <a:fld id="{2B3C3A7C-569B-4175-B09F-B289B3E9820E}" type="datetimeFigureOut">
               <a:rPr lang="en-US" smtClean="0"/>
-              <a:t>10/22/2019</a:t>
+              <a:t>10/23/2019</a:t>
             </a:fld>
             <a:endParaRPr lang="en-US"/>
           </a:p>
@@ -867,7 +868,7 @@
           <a:p>
             <a:fld id="{2B3C3A7C-569B-4175-B09F-B289B3E9820E}" type="datetimeFigureOut">
               <a:rPr lang="en-US" smtClean="0"/>
-              <a:t>10/22/2019</a:t>
+              <a:t>10/23/2019</a:t>
             </a:fld>
             <a:endParaRPr lang="en-US"/>
           </a:p>
@@ -1142,7 +1143,7 @@
           <a:p>
             <a:fld id="{2B3C3A7C-569B-4175-B09F-B289B3E9820E}" type="datetimeFigureOut">
               <a:rPr lang="en-US" smtClean="0"/>
-              <a:t>10/22/2019</a:t>
+              <a:t>10/23/2019</a:t>
             </a:fld>
             <a:endParaRPr lang="en-US"/>
           </a:p>
@@ -1407,7 +1408,7 @@
           <a:p>
             <a:fld id="{2B3C3A7C-569B-4175-B09F-B289B3E9820E}" type="datetimeFigureOut">
               <a:rPr lang="en-US" smtClean="0"/>
-              <a:t>10/22/2019</a:t>
+              <a:t>10/23/2019</a:t>
             </a:fld>
             <a:endParaRPr lang="en-US"/>
           </a:p>
@@ -1819,7 +1820,7 @@
           <a:p>
             <a:fld id="{2B3C3A7C-569B-4175-B09F-B289B3E9820E}" type="datetimeFigureOut">
               <a:rPr lang="en-US" smtClean="0"/>
-              <a:t>10/22/2019</a:t>
+              <a:t>10/23/2019</a:t>
             </a:fld>
             <a:endParaRPr lang="en-US"/>
           </a:p>
@@ -1960,7 +1961,7 @@
           <a:p>
             <a:fld id="{2B3C3A7C-569B-4175-B09F-B289B3E9820E}" type="datetimeFigureOut">
               <a:rPr lang="en-US" smtClean="0"/>
-              <a:t>10/22/2019</a:t>
+              <a:t>10/23/2019</a:t>
             </a:fld>
             <a:endParaRPr lang="en-US"/>
           </a:p>
@@ -2073,7 +2074,7 @@
           <a:p>
             <a:fld id="{2B3C3A7C-569B-4175-B09F-B289B3E9820E}" type="datetimeFigureOut">
               <a:rPr lang="en-US" smtClean="0"/>
-              <a:t>10/22/2019</a:t>
+              <a:t>10/23/2019</a:t>
             </a:fld>
             <a:endParaRPr lang="en-US"/>
           </a:p>
@@ -2384,7 +2385,7 @@
           <a:p>
             <a:fld id="{2B3C3A7C-569B-4175-B09F-B289B3E9820E}" type="datetimeFigureOut">
               <a:rPr lang="en-US" smtClean="0"/>
-              <a:t>10/22/2019</a:t>
+              <a:t>10/23/2019</a:t>
             </a:fld>
             <a:endParaRPr lang="en-US"/>
           </a:p>
@@ -2672,7 +2673,7 @@
           <a:p>
             <a:fld id="{2B3C3A7C-569B-4175-B09F-B289B3E9820E}" type="datetimeFigureOut">
               <a:rPr lang="en-US" smtClean="0"/>
-              <a:t>10/22/2019</a:t>
+              <a:t>10/23/2019</a:t>
             </a:fld>
             <a:endParaRPr lang="en-US"/>
           </a:p>
@@ -2913,7 +2914,7 @@
           <a:p>
             <a:fld id="{2B3C3A7C-569B-4175-B09F-B289B3E9820E}" type="datetimeFigureOut">
               <a:rPr lang="en-US" smtClean="0"/>
-              <a:t>10/22/2019</a:t>
+              <a:t>10/23/2019</a:t>
             </a:fld>
             <a:endParaRPr lang="en-US"/>
           </a:p>
@@ -6359,10 +6360,531 @@
           </a:p>
         </p:txBody>
       </p:sp>
+      <p:pic>
+        <p:nvPicPr>
+          <p:cNvPr id="3" name="Graphic 2">
+            <a:extLst>
+              <a:ext uri="{FF2B5EF4-FFF2-40B4-BE49-F238E27FC236}">
+                <a16:creationId xmlns:a16="http://schemas.microsoft.com/office/drawing/2014/main" id="{8344458D-9272-41EE-A64E-66A16FC991E9}"/>
+              </a:ext>
+            </a:extLst>
+          </p:cNvPr>
+          <p:cNvPicPr>
+            <a:picLocks noChangeAspect="1"/>
+          </p:cNvPicPr>
+          <p:nvPr/>
+        </p:nvPicPr>
+        <p:blipFill>
+          <a:blip r:embed="rId8">
+            <a:extLst>
+              <a:ext uri="{28A0092B-C50C-407E-A947-70E740481C1C}">
+                <a14:useLocalDpi xmlns:a14="http://schemas.microsoft.com/office/drawing/2010/main" val="0"/>
+              </a:ext>
+              <a:ext uri="{96DAC541-7B7A-43D3-8B79-37D633B846F1}">
+                <asvg:svgBlip xmlns:asvg="http://schemas.microsoft.com/office/drawing/2016/SVG/main" r:embed="rId9"/>
+              </a:ext>
+            </a:extLst>
+          </a:blip>
+          <a:stretch>
+            <a:fillRect/>
+          </a:stretch>
+        </p:blipFill>
+        <p:spPr>
+          <a:xfrm>
+            <a:off x="8101016" y="3788090"/>
+            <a:ext cx="3943354" cy="2959124"/>
+          </a:xfrm>
+          <a:prstGeom prst="rect">
+            <a:avLst/>
+          </a:prstGeom>
+        </p:spPr>
+      </p:pic>
+      <p:pic>
+        <p:nvPicPr>
+          <p:cNvPr id="6" name="Graphic 5">
+            <a:extLst>
+              <a:ext uri="{FF2B5EF4-FFF2-40B4-BE49-F238E27FC236}">
+                <a16:creationId xmlns:a16="http://schemas.microsoft.com/office/drawing/2014/main" id="{6886FD85-4677-4BFB-BC9D-8B2AB8444B6E}"/>
+              </a:ext>
+            </a:extLst>
+          </p:cNvPr>
+          <p:cNvPicPr>
+            <a:picLocks noChangeAspect="1"/>
+          </p:cNvPicPr>
+          <p:nvPr/>
+        </p:nvPicPr>
+        <p:blipFill>
+          <a:blip r:embed="rId10">
+            <a:extLst>
+              <a:ext uri="{28A0092B-C50C-407E-A947-70E740481C1C}">
+                <a14:useLocalDpi xmlns:a14="http://schemas.microsoft.com/office/drawing/2010/main" val="0"/>
+              </a:ext>
+              <a:ext uri="{96DAC541-7B7A-43D3-8B79-37D633B846F1}">
+                <asvg:svgBlip xmlns:asvg="http://schemas.microsoft.com/office/drawing/2016/SVG/main" r:embed="rId11"/>
+              </a:ext>
+            </a:extLst>
+          </a:blip>
+          <a:stretch>
+            <a:fillRect/>
+          </a:stretch>
+        </p:blipFill>
+        <p:spPr>
+          <a:xfrm>
+            <a:off x="4011088" y="3788090"/>
+            <a:ext cx="4090989" cy="3069910"/>
+          </a:xfrm>
+          <a:prstGeom prst="rect">
+            <a:avLst/>
+          </a:prstGeom>
+        </p:spPr>
+      </p:pic>
+      <p:pic>
+        <p:nvPicPr>
+          <p:cNvPr id="11" name="Graphic 10">
+            <a:extLst>
+              <a:ext uri="{FF2B5EF4-FFF2-40B4-BE49-F238E27FC236}">
+                <a16:creationId xmlns:a16="http://schemas.microsoft.com/office/drawing/2014/main" id="{F65E6D2A-E5A6-4FB2-B8CF-6EDA02B64B53}"/>
+              </a:ext>
+            </a:extLst>
+          </p:cNvPr>
+          <p:cNvPicPr>
+            <a:picLocks noChangeAspect="1"/>
+          </p:cNvPicPr>
+          <p:nvPr/>
+        </p:nvPicPr>
+        <p:blipFill>
+          <a:blip r:embed="rId12">
+            <a:extLst>
+              <a:ext uri="{28A0092B-C50C-407E-A947-70E740481C1C}">
+                <a14:useLocalDpi xmlns:a14="http://schemas.microsoft.com/office/drawing/2010/main" val="0"/>
+              </a:ext>
+              <a:ext uri="{96DAC541-7B7A-43D3-8B79-37D633B846F1}">
+                <asvg:svgBlip xmlns:asvg="http://schemas.microsoft.com/office/drawing/2016/SVG/main" r:embed="rId13"/>
+              </a:ext>
+            </a:extLst>
+          </a:blip>
+          <a:stretch>
+            <a:fillRect/>
+          </a:stretch>
+        </p:blipFill>
+        <p:spPr>
+          <a:xfrm>
+            <a:off x="0" y="3788090"/>
+            <a:ext cx="4090987" cy="3069909"/>
+          </a:xfrm>
+          <a:prstGeom prst="rect">
+            <a:avLst/>
+          </a:prstGeom>
+        </p:spPr>
+      </p:pic>
+      <p:sp>
+        <p:nvSpPr>
+          <p:cNvPr id="12" name="TextBox 11">
+            <a:extLst>
+              <a:ext uri="{FF2B5EF4-FFF2-40B4-BE49-F238E27FC236}">
+                <a16:creationId xmlns:a16="http://schemas.microsoft.com/office/drawing/2014/main" id="{1FB7FF64-8630-46B3-B968-5BD8FA44EB02}"/>
+              </a:ext>
+            </a:extLst>
+          </p:cNvPr>
+          <p:cNvSpPr txBox="1"/>
+          <p:nvPr/>
+        </p:nvSpPr>
+        <p:spPr>
+          <a:xfrm>
+            <a:off x="0" y="3545802"/>
+            <a:ext cx="2343150" cy="523220"/>
+          </a:xfrm>
+          <a:prstGeom prst="rect">
+            <a:avLst/>
+          </a:prstGeom>
+          <a:noFill/>
+        </p:spPr>
+        <p:txBody>
+          <a:bodyPr wrap="square" rtlCol="0">
+            <a:spAutoFit/>
+          </a:bodyPr>
+          <a:lstStyle/>
+          <a:p>
+            <a:r>
+              <a:rPr lang="en-US" sz="2800" dirty="0"/>
+              <a:t>L=26</a:t>
+            </a:r>
+          </a:p>
+        </p:txBody>
+      </p:sp>
     </p:spTree>
     <p:extLst>
       <p:ext uri="{BB962C8B-B14F-4D97-AF65-F5344CB8AC3E}">
         <p14:creationId xmlns:p14="http://schemas.microsoft.com/office/powerpoint/2010/main" val="3819542966"/>
+      </p:ext>
+    </p:extLst>
+  </p:cSld>
+  <p:clrMapOvr>
+    <a:masterClrMapping/>
+  </p:clrMapOvr>
+</p:sld>
+</file>
+
+<file path=ppt/slides/slide6.xml><?xml version="1.0" encoding="utf-8"?>
+<p:sld xmlns:a="http://schemas.openxmlformats.org/drawingml/2006/main" xmlns:r="http://schemas.openxmlformats.org/officeDocument/2006/relationships" xmlns:p="http://schemas.openxmlformats.org/presentationml/2006/main">
+  <p:cSld>
+    <p:spTree>
+      <p:nvGrpSpPr>
+        <p:cNvPr id="1" name=""/>
+        <p:cNvGrpSpPr/>
+        <p:nvPr/>
+      </p:nvGrpSpPr>
+      <p:grpSpPr>
+        <a:xfrm>
+          <a:off x="0" y="0"/>
+          <a:ext cx="0" cy="0"/>
+          <a:chOff x="0" y="0"/>
+          <a:chExt cx="0" cy="0"/>
+        </a:xfrm>
+      </p:grpSpPr>
+      <p:pic>
+        <p:nvPicPr>
+          <p:cNvPr id="5" name="Graphic 4">
+            <a:extLst>
+              <a:ext uri="{FF2B5EF4-FFF2-40B4-BE49-F238E27FC236}">
+                <a16:creationId xmlns:a16="http://schemas.microsoft.com/office/drawing/2014/main" id="{2C9ED5DF-C7BF-419C-8139-5E23DA41D800}"/>
+              </a:ext>
+            </a:extLst>
+          </p:cNvPr>
+          <p:cNvPicPr>
+            <a:picLocks noChangeAspect="1"/>
+          </p:cNvPicPr>
+          <p:nvPr/>
+        </p:nvPicPr>
+        <p:blipFill>
+          <a:blip r:embed="rId2">
+            <a:extLst>
+              <a:ext uri="{28A0092B-C50C-407E-A947-70E740481C1C}">
+                <a14:useLocalDpi xmlns:a14="http://schemas.microsoft.com/office/drawing/2010/main" val="0"/>
+              </a:ext>
+              <a:ext uri="{96DAC541-7B7A-43D3-8B79-37D633B846F1}">
+                <asvg:svgBlip xmlns:asvg="http://schemas.microsoft.com/office/drawing/2016/SVG/main" r:embed="rId3"/>
+              </a:ext>
+            </a:extLst>
+          </a:blip>
+          <a:stretch>
+            <a:fillRect/>
+          </a:stretch>
+        </p:blipFill>
+        <p:spPr>
+          <a:xfrm>
+            <a:off x="0" y="593274"/>
+            <a:ext cx="3746377" cy="2811311"/>
+          </a:xfrm>
+          <a:prstGeom prst="rect">
+            <a:avLst/>
+          </a:prstGeom>
+        </p:spPr>
+      </p:pic>
+      <p:pic>
+        <p:nvPicPr>
+          <p:cNvPr id="7" name="Graphic 6">
+            <a:extLst>
+              <a:ext uri="{FF2B5EF4-FFF2-40B4-BE49-F238E27FC236}">
+                <a16:creationId xmlns:a16="http://schemas.microsoft.com/office/drawing/2014/main" id="{2A68FD68-FE05-4405-989D-3673D993F647}"/>
+              </a:ext>
+            </a:extLst>
+          </p:cNvPr>
+          <p:cNvPicPr>
+            <a:picLocks noChangeAspect="1"/>
+          </p:cNvPicPr>
+          <p:nvPr/>
+        </p:nvPicPr>
+        <p:blipFill>
+          <a:blip r:embed="rId4">
+            <a:extLst>
+              <a:ext uri="{28A0092B-C50C-407E-A947-70E740481C1C}">
+                <a14:useLocalDpi xmlns:a14="http://schemas.microsoft.com/office/drawing/2010/main" val="0"/>
+              </a:ext>
+              <a:ext uri="{96DAC541-7B7A-43D3-8B79-37D633B846F1}">
+                <asvg:svgBlip xmlns:asvg="http://schemas.microsoft.com/office/drawing/2016/SVG/main" r:embed="rId5"/>
+              </a:ext>
+            </a:extLst>
+          </a:blip>
+          <a:stretch>
+            <a:fillRect/>
+          </a:stretch>
+        </p:blipFill>
+        <p:spPr>
+          <a:xfrm>
+            <a:off x="3478428" y="538766"/>
+            <a:ext cx="3819017" cy="2865820"/>
+          </a:xfrm>
+          <a:prstGeom prst="rect">
+            <a:avLst/>
+          </a:prstGeom>
+        </p:spPr>
+      </p:pic>
+      <p:pic>
+        <p:nvPicPr>
+          <p:cNvPr id="9" name="Graphic 8">
+            <a:extLst>
+              <a:ext uri="{FF2B5EF4-FFF2-40B4-BE49-F238E27FC236}">
+                <a16:creationId xmlns:a16="http://schemas.microsoft.com/office/drawing/2014/main" id="{E1E0387B-3D92-4126-865E-B63DFAB3A1E1}"/>
+              </a:ext>
+            </a:extLst>
+          </p:cNvPr>
+          <p:cNvPicPr>
+            <a:picLocks noChangeAspect="1"/>
+          </p:cNvPicPr>
+          <p:nvPr/>
+        </p:nvPicPr>
+        <p:blipFill>
+          <a:blip r:embed="rId6">
+            <a:extLst>
+              <a:ext uri="{28A0092B-C50C-407E-A947-70E740481C1C}">
+                <a14:useLocalDpi xmlns:a14="http://schemas.microsoft.com/office/drawing/2010/main" val="0"/>
+              </a:ext>
+              <a:ext uri="{96DAC541-7B7A-43D3-8B79-37D633B846F1}">
+                <asvg:svgBlip xmlns:asvg="http://schemas.microsoft.com/office/drawing/2016/SVG/main" r:embed="rId7"/>
+              </a:ext>
+            </a:extLst>
+          </a:blip>
+          <a:stretch>
+            <a:fillRect/>
+          </a:stretch>
+        </p:blipFill>
+        <p:spPr>
+          <a:xfrm>
+            <a:off x="7136028" y="593273"/>
+            <a:ext cx="3746377" cy="2811311"/>
+          </a:xfrm>
+          <a:prstGeom prst="rect">
+            <a:avLst/>
+          </a:prstGeom>
+        </p:spPr>
+      </p:pic>
+      <p:sp>
+        <p:nvSpPr>
+          <p:cNvPr id="10" name="TextBox 9">
+            <a:extLst>
+              <a:ext uri="{FF2B5EF4-FFF2-40B4-BE49-F238E27FC236}">
+                <a16:creationId xmlns:a16="http://schemas.microsoft.com/office/drawing/2014/main" id="{002BE98C-F3B8-4A0E-BFAF-A36664083A4E}"/>
+              </a:ext>
+            </a:extLst>
+          </p:cNvPr>
+          <p:cNvSpPr txBox="1"/>
+          <p:nvPr/>
+        </p:nvSpPr>
+        <p:spPr>
+          <a:xfrm>
+            <a:off x="372862" y="266330"/>
+            <a:ext cx="1464816" cy="369332"/>
+          </a:xfrm>
+          <a:prstGeom prst="rect">
+            <a:avLst/>
+          </a:prstGeom>
+          <a:noFill/>
+        </p:spPr>
+        <p:txBody>
+          <a:bodyPr wrap="square" rtlCol="0">
+            <a:spAutoFit/>
+          </a:bodyPr>
+          <a:lstStyle/>
+          <a:p>
+            <a:r>
+              <a:rPr lang="en-US" dirty="0"/>
+              <a:t>N=2</a:t>
+            </a:r>
+          </a:p>
+        </p:txBody>
+      </p:sp>
+      <p:pic>
+        <p:nvPicPr>
+          <p:cNvPr id="12" name="Graphic 11">
+            <a:extLst>
+              <a:ext uri="{FF2B5EF4-FFF2-40B4-BE49-F238E27FC236}">
+                <a16:creationId xmlns:a16="http://schemas.microsoft.com/office/drawing/2014/main" id="{FEB0D44F-49F7-423B-8940-A0916BAFE317}"/>
+              </a:ext>
+            </a:extLst>
+          </p:cNvPr>
+          <p:cNvPicPr>
+            <a:picLocks noChangeAspect="1"/>
+          </p:cNvPicPr>
+          <p:nvPr/>
+        </p:nvPicPr>
+        <p:blipFill>
+          <a:blip r:embed="rId8">
+            <a:extLst>
+              <a:ext uri="{28A0092B-C50C-407E-A947-70E740481C1C}">
+                <a14:useLocalDpi xmlns:a14="http://schemas.microsoft.com/office/drawing/2010/main" val="0"/>
+              </a:ext>
+              <a:ext uri="{96DAC541-7B7A-43D3-8B79-37D633B846F1}">
+                <asvg:svgBlip xmlns:asvg="http://schemas.microsoft.com/office/drawing/2016/SVG/main" r:embed="rId9"/>
+              </a:ext>
+            </a:extLst>
+          </a:blip>
+          <a:stretch>
+            <a:fillRect/>
+          </a:stretch>
+        </p:blipFill>
+        <p:spPr>
+          <a:xfrm>
+            <a:off x="8877" y="4046688"/>
+            <a:ext cx="2867488" cy="2811312"/>
+          </a:xfrm>
+          <a:prstGeom prst="rect">
+            <a:avLst/>
+          </a:prstGeom>
+        </p:spPr>
+      </p:pic>
+      <p:pic>
+        <p:nvPicPr>
+          <p:cNvPr id="14" name="Graphic 13">
+            <a:extLst>
+              <a:ext uri="{FF2B5EF4-FFF2-40B4-BE49-F238E27FC236}">
+                <a16:creationId xmlns:a16="http://schemas.microsoft.com/office/drawing/2014/main" id="{902CBE0E-108B-4741-9CF4-F57D3FECC8B8}"/>
+              </a:ext>
+            </a:extLst>
+          </p:cNvPr>
+          <p:cNvPicPr>
+            <a:picLocks noChangeAspect="1"/>
+          </p:cNvPicPr>
+          <p:nvPr/>
+        </p:nvPicPr>
+        <p:blipFill>
+          <a:blip r:embed="rId10">
+            <a:extLst>
+              <a:ext uri="{28A0092B-C50C-407E-A947-70E740481C1C}">
+                <a14:useLocalDpi xmlns:a14="http://schemas.microsoft.com/office/drawing/2010/main" val="0"/>
+              </a:ext>
+              <a:ext uri="{96DAC541-7B7A-43D3-8B79-37D633B846F1}">
+                <asvg:svgBlip xmlns:asvg="http://schemas.microsoft.com/office/drawing/2016/SVG/main" r:embed="rId11"/>
+              </a:ext>
+            </a:extLst>
+          </a:blip>
+          <a:stretch>
+            <a:fillRect/>
+          </a:stretch>
+        </p:blipFill>
+        <p:spPr>
+          <a:xfrm>
+            <a:off x="3478429" y="3992178"/>
+            <a:ext cx="2744818" cy="2865821"/>
+          </a:xfrm>
+          <a:prstGeom prst="rect">
+            <a:avLst/>
+          </a:prstGeom>
+        </p:spPr>
+      </p:pic>
+      <p:pic>
+        <p:nvPicPr>
+          <p:cNvPr id="16" name="Graphic 15">
+            <a:extLst>
+              <a:ext uri="{FF2B5EF4-FFF2-40B4-BE49-F238E27FC236}">
+                <a16:creationId xmlns:a16="http://schemas.microsoft.com/office/drawing/2014/main" id="{B717E3A2-6C0D-4E50-A2D8-894C8C3BF8BA}"/>
+              </a:ext>
+            </a:extLst>
+          </p:cNvPr>
+          <p:cNvPicPr>
+            <a:picLocks noChangeAspect="1"/>
+          </p:cNvPicPr>
+          <p:nvPr/>
+        </p:nvPicPr>
+        <p:blipFill>
+          <a:blip r:embed="rId12">
+            <a:extLst>
+              <a:ext uri="{28A0092B-C50C-407E-A947-70E740481C1C}">
+                <a14:useLocalDpi xmlns:a14="http://schemas.microsoft.com/office/drawing/2010/main" val="0"/>
+              </a:ext>
+              <a:ext uri="{96DAC541-7B7A-43D3-8B79-37D633B846F1}">
+                <asvg:svgBlip xmlns:asvg="http://schemas.microsoft.com/office/drawing/2016/SVG/main" r:embed="rId13"/>
+              </a:ext>
+            </a:extLst>
+          </a:blip>
+          <a:stretch>
+            <a:fillRect/>
+          </a:stretch>
+        </p:blipFill>
+        <p:spPr>
+          <a:xfrm>
+            <a:off x="7136029" y="3872514"/>
+            <a:ext cx="2851350" cy="2865821"/>
+          </a:xfrm>
+          <a:prstGeom prst="rect">
+            <a:avLst/>
+          </a:prstGeom>
+        </p:spPr>
+      </p:pic>
+      <p:sp>
+        <p:nvSpPr>
+          <p:cNvPr id="17" name="TextBox 16">
+            <a:extLst>
+              <a:ext uri="{FF2B5EF4-FFF2-40B4-BE49-F238E27FC236}">
+                <a16:creationId xmlns:a16="http://schemas.microsoft.com/office/drawing/2014/main" id="{8C19088C-2EA2-4439-B8F5-425BFCE6492F}"/>
+              </a:ext>
+            </a:extLst>
+          </p:cNvPr>
+          <p:cNvSpPr txBox="1"/>
+          <p:nvPr/>
+        </p:nvSpPr>
+        <p:spPr>
+          <a:xfrm>
+            <a:off x="108011" y="3992178"/>
+            <a:ext cx="1464816" cy="369332"/>
+          </a:xfrm>
+          <a:prstGeom prst="rect">
+            <a:avLst/>
+          </a:prstGeom>
+          <a:noFill/>
+        </p:spPr>
+        <p:txBody>
+          <a:bodyPr wrap="square" rtlCol="0">
+            <a:spAutoFit/>
+          </a:bodyPr>
+          <a:lstStyle/>
+          <a:p>
+            <a:r>
+              <a:rPr lang="en-US" dirty="0"/>
+              <a:t>N=10</a:t>
+            </a:r>
+          </a:p>
+        </p:txBody>
+      </p:sp>
+      <p:sp>
+        <p:nvSpPr>
+          <p:cNvPr id="18" name="TextBox 17">
+            <a:extLst>
+              <a:ext uri="{FF2B5EF4-FFF2-40B4-BE49-F238E27FC236}">
+                <a16:creationId xmlns:a16="http://schemas.microsoft.com/office/drawing/2014/main" id="{497424A4-DDF1-4619-B860-72591D6108CF}"/>
+              </a:ext>
+            </a:extLst>
+          </p:cNvPr>
+          <p:cNvSpPr txBox="1"/>
+          <p:nvPr/>
+        </p:nvSpPr>
+        <p:spPr>
+          <a:xfrm>
+            <a:off x="10688715" y="3755254"/>
+            <a:ext cx="1097734" cy="646331"/>
+          </a:xfrm>
+          <a:prstGeom prst="rect">
+            <a:avLst/>
+          </a:prstGeom>
+          <a:noFill/>
+        </p:spPr>
+        <p:txBody>
+          <a:bodyPr wrap="square" rtlCol="0">
+            <a:spAutoFit/>
+          </a:bodyPr>
+          <a:lstStyle/>
+          <a:p>
+            <a:r>
+              <a:rPr lang="en-US" dirty="0"/>
+              <a:t>L=26 for both</a:t>
+            </a:r>
+          </a:p>
+        </p:txBody>
+      </p:sp>
+    </p:spTree>
+    <p:extLst>
+      <p:ext uri="{BB962C8B-B14F-4D97-AF65-F5344CB8AC3E}">
+        <p14:creationId xmlns:p14="http://schemas.microsoft.com/office/powerpoint/2010/main" val="434153909"/>
       </p:ext>
     </p:extLst>
   </p:cSld>

</xml_diff>